<commit_message>
Read me si prezentare actualizata
</commit_message>
<xml_diff>
--- a/Tema 5.pptx
+++ b/Tema 5.pptx
@@ -14,6 +14,12 @@
     <p:sldId id="262" r:id="rId8"/>
     <p:sldId id="264" r:id="rId9"/>
     <p:sldId id="263" r:id="rId10"/>
+    <p:sldId id="265" r:id="rId11"/>
+    <p:sldId id="266" r:id="rId12"/>
+    <p:sldId id="267" r:id="rId13"/>
+    <p:sldId id="268" r:id="rId14"/>
+    <p:sldId id="269" r:id="rId15"/>
+    <p:sldId id="270" r:id="rId16"/>
   </p:sldIdLst>
   <p:sldSz cx="12192000" cy="6858000"/>
   <p:notesSz cx="6858000" cy="9144000"/>
@@ -112,6 +118,11 @@
       </a:defRPr>
     </a:lvl9pPr>
   </p:defaultTextStyle>
+  <p:extLst>
+    <p:ext uri="{EFAFB233-063F-42B5-8137-9DF3F51BA10A}">
+      <p15:sldGuideLst xmlns:p15="http://schemas.microsoft.com/office/powerpoint/2012/main"/>
+    </p:ext>
+  </p:extLst>
 </p:presentation>
 </file>
 
@@ -3891,6 +3902,3692 @@
 </p:sld>
 </file>
 
+<file path=ppt/slides/slide10.xml><?xml version="1.0" encoding="utf-8"?>
+<p:sld xmlns:a="http://schemas.openxmlformats.org/drawingml/2006/main" xmlns:r="http://schemas.openxmlformats.org/officeDocument/2006/relationships" xmlns:p="http://schemas.openxmlformats.org/presentationml/2006/main">
+  <p:cSld>
+    <p:spTree>
+      <p:nvGrpSpPr>
+        <p:cNvPr id="1" name=""/>
+        <p:cNvGrpSpPr/>
+        <p:nvPr/>
+      </p:nvGrpSpPr>
+      <p:grpSpPr>
+        <a:xfrm>
+          <a:off x="0" y="0"/>
+          <a:ext cx="0" cy="0"/>
+          <a:chOff x="0" y="0"/>
+          <a:chExt cx="0" cy="0"/>
+        </a:xfrm>
+      </p:grpSpPr>
+      <p:sp>
+        <p:nvSpPr>
+          <p:cNvPr id="2" name="Title 1">
+            <a:extLst>
+              <a:ext uri="{FF2B5EF4-FFF2-40B4-BE49-F238E27FC236}">
+                <a16:creationId xmlns:a16="http://schemas.microsoft.com/office/drawing/2014/main" id="{AE7C8393-A46C-4719-9D3B-C38018325980}"/>
+              </a:ext>
+            </a:extLst>
+          </p:cNvPr>
+          <p:cNvSpPr>
+            <a:spLocks noGrp="1"/>
+          </p:cNvSpPr>
+          <p:nvPr>
+            <p:ph type="title"/>
+          </p:nvPr>
+        </p:nvSpPr>
+        <p:spPr/>
+        <p:txBody>
+          <a:bodyPr/>
+          <a:lstStyle/>
+          <a:p>
+            <a:r>
+              <a:rPr lang="en-US" dirty="0" err="1"/>
+              <a:t>Aplicatie</a:t>
+            </a:r>
+            <a:endParaRPr lang="en-GB" dirty="0"/>
+          </a:p>
+        </p:txBody>
+      </p:sp>
+      <p:sp>
+        <p:nvSpPr>
+          <p:cNvPr id="3" name="Content Placeholder 2">
+            <a:extLst>
+              <a:ext uri="{FF2B5EF4-FFF2-40B4-BE49-F238E27FC236}">
+                <a16:creationId xmlns:a16="http://schemas.microsoft.com/office/drawing/2014/main" id="{01524CEF-3D31-4BEC-B310-F5208B6568A3}"/>
+              </a:ext>
+            </a:extLst>
+          </p:cNvPr>
+          <p:cNvSpPr>
+            <a:spLocks noGrp="1"/>
+          </p:cNvSpPr>
+          <p:nvPr>
+            <p:ph idx="1"/>
+          </p:nvPr>
+        </p:nvSpPr>
+        <p:spPr/>
+        <p:txBody>
+          <a:bodyPr>
+            <a:normAutofit fontScale="70000" lnSpcReduction="20000"/>
+          </a:bodyPr>
+          <a:lstStyle/>
+          <a:p>
+            <a:r>
+              <a:rPr lang="en-GB" dirty="0" err="1"/>
+              <a:t>Aplicatia</a:t>
+            </a:r>
+            <a:r>
+              <a:rPr lang="en-GB" dirty="0"/>
+              <a:t> are ca </a:t>
+            </a:r>
+            <a:r>
+              <a:rPr lang="en-GB" dirty="0" err="1"/>
+              <a:t>referinta</a:t>
+            </a:r>
+            <a:r>
+              <a:rPr lang="en-GB" dirty="0"/>
+              <a:t> </a:t>
+            </a:r>
+            <a:r>
+              <a:rPr lang="en-GB" dirty="0" err="1"/>
+              <a:t>codul</a:t>
+            </a:r>
+            <a:r>
+              <a:rPr lang="en-GB" dirty="0"/>
+              <a:t> de la </a:t>
+            </a:r>
+            <a:r>
+              <a:rPr lang="en-GB" dirty="0" err="1"/>
+              <a:t>acest</a:t>
+            </a:r>
+            <a:r>
+              <a:rPr lang="en-GB" dirty="0"/>
+              <a:t> </a:t>
+            </a:r>
+            <a:r>
+              <a:rPr lang="en-GB" dirty="0" err="1"/>
+              <a:t>repozitoriu</a:t>
+            </a:r>
+            <a:r>
+              <a:rPr lang="en-GB" dirty="0"/>
+              <a:t>, </a:t>
+            </a:r>
+            <a:r>
+              <a:rPr lang="en-GB" dirty="0" err="1"/>
+              <a:t>testele</a:t>
+            </a:r>
+            <a:r>
+              <a:rPr lang="en-GB" dirty="0"/>
+              <a:t> </a:t>
+            </a:r>
+            <a:r>
+              <a:rPr lang="en-GB" dirty="0" err="1"/>
+              <a:t>fiind</a:t>
+            </a:r>
+            <a:r>
+              <a:rPr lang="en-GB" dirty="0"/>
+              <a:t> create de </a:t>
+            </a:r>
+            <a:r>
+              <a:rPr lang="en-GB" dirty="0" err="1"/>
+              <a:t>noi</a:t>
+            </a:r>
+            <a:r>
+              <a:rPr lang="en-GB" dirty="0"/>
+              <a:t>. https://github.com/yogeshgiri904/to-do </a:t>
+            </a:r>
+          </a:p>
+          <a:p>
+            <a:r>
+              <a:rPr lang="en-GB" dirty="0" err="1"/>
+              <a:t>Aplicația</a:t>
+            </a:r>
+            <a:r>
+              <a:rPr lang="en-GB" dirty="0"/>
+              <a:t> </a:t>
+            </a:r>
+            <a:r>
+              <a:rPr lang="en-GB" dirty="0" err="1"/>
+              <a:t>noastră</a:t>
+            </a:r>
+            <a:r>
+              <a:rPr lang="en-GB" dirty="0"/>
+              <a:t> </a:t>
+            </a:r>
+            <a:r>
+              <a:rPr lang="en-GB" dirty="0" err="1"/>
+              <a:t>este</a:t>
+            </a:r>
+            <a:r>
+              <a:rPr lang="en-GB" dirty="0"/>
+              <a:t> una frontend </a:t>
+            </a:r>
+            <a:r>
+              <a:rPr lang="en-GB" dirty="0" err="1"/>
+              <a:t>și</a:t>
+            </a:r>
+            <a:r>
+              <a:rPr lang="en-GB" dirty="0"/>
+              <a:t> backend, </a:t>
+            </a:r>
+            <a:r>
+              <a:rPr lang="en-GB" dirty="0" err="1"/>
+              <a:t>folosind</a:t>
+            </a:r>
+            <a:r>
+              <a:rPr lang="en-GB" dirty="0"/>
+              <a:t> PHP, </a:t>
+            </a:r>
+            <a:r>
+              <a:rPr lang="en-GB" dirty="0" err="1"/>
+              <a:t>și</a:t>
+            </a:r>
+            <a:r>
+              <a:rPr lang="en-GB" dirty="0"/>
+              <a:t> </a:t>
+            </a:r>
+            <a:r>
+              <a:rPr lang="en-GB" dirty="0" err="1"/>
+              <a:t>Mysql</a:t>
+            </a:r>
+            <a:r>
+              <a:rPr lang="en-GB" dirty="0"/>
+              <a:t> (cu </a:t>
+            </a:r>
+            <a:r>
+              <a:rPr lang="en-GB" dirty="0" err="1"/>
+              <a:t>mariaDB</a:t>
+            </a:r>
+            <a:r>
+              <a:rPr lang="en-GB" dirty="0"/>
+              <a:t>). </a:t>
+            </a:r>
+            <a:r>
+              <a:rPr lang="en-GB" dirty="0" err="1"/>
+              <a:t>Serviciul</a:t>
+            </a:r>
+            <a:r>
+              <a:rPr lang="en-GB" dirty="0"/>
+              <a:t> </a:t>
+            </a:r>
+            <a:r>
+              <a:rPr lang="en-GB" dirty="0" err="1"/>
+              <a:t>este</a:t>
+            </a:r>
+            <a:r>
+              <a:rPr lang="en-GB" dirty="0"/>
+              <a:t> </a:t>
+            </a:r>
+            <a:r>
+              <a:rPr lang="en-GB" dirty="0" err="1"/>
+              <a:t>unul</a:t>
+            </a:r>
+            <a:r>
+              <a:rPr lang="en-GB" dirty="0"/>
+              <a:t> de </a:t>
+            </a:r>
+            <a:r>
+              <a:rPr lang="en-GB" dirty="0" err="1"/>
+              <a:t>notițe</a:t>
+            </a:r>
+            <a:r>
+              <a:rPr lang="en-GB" dirty="0"/>
+              <a:t>, care </a:t>
+            </a:r>
+            <a:r>
+              <a:rPr lang="en-GB" dirty="0" err="1"/>
+              <a:t>permite</a:t>
+            </a:r>
+            <a:r>
+              <a:rPr lang="en-GB" dirty="0"/>
+              <a:t> </a:t>
+            </a:r>
+            <a:r>
+              <a:rPr lang="en-GB" dirty="0" err="1"/>
+              <a:t>crearea</a:t>
+            </a:r>
+            <a:r>
+              <a:rPr lang="en-GB" dirty="0"/>
+              <a:t> </a:t>
+            </a:r>
+            <a:r>
+              <a:rPr lang="en-GB" dirty="0" err="1"/>
+              <a:t>unei</a:t>
+            </a:r>
+            <a:r>
+              <a:rPr lang="en-GB" dirty="0"/>
+              <a:t> note </a:t>
+            </a:r>
+          </a:p>
+          <a:p>
+            <a:r>
+              <a:rPr lang="en-GB" dirty="0"/>
+              <a:t>cu un </a:t>
+            </a:r>
+            <a:r>
+              <a:rPr lang="en-GB" dirty="0" err="1"/>
+              <a:t>titlu</a:t>
+            </a:r>
+            <a:r>
+              <a:rPr lang="en-GB" dirty="0"/>
+              <a:t>, </a:t>
+            </a:r>
+            <a:r>
+              <a:rPr lang="en-GB" dirty="0" err="1"/>
+              <a:t>conținut</a:t>
+            </a:r>
+            <a:r>
+              <a:rPr lang="en-GB" dirty="0"/>
+              <a:t> text (de tip </a:t>
+            </a:r>
+            <a:r>
+              <a:rPr lang="en-GB" dirty="0" err="1"/>
+              <a:t>longtext</a:t>
+            </a:r>
+            <a:r>
+              <a:rPr lang="en-GB" dirty="0"/>
+              <a:t>) </a:t>
+            </a:r>
+            <a:r>
+              <a:rPr lang="en-GB" dirty="0" err="1"/>
+              <a:t>și</a:t>
+            </a:r>
+            <a:r>
+              <a:rPr lang="en-GB" dirty="0"/>
+              <a:t> </a:t>
+            </a:r>
+            <a:r>
+              <a:rPr lang="en-GB" dirty="0" err="1"/>
+              <a:t>este</a:t>
+            </a:r>
+            <a:r>
+              <a:rPr lang="en-GB" dirty="0"/>
+              <a:t> </a:t>
+            </a:r>
+            <a:r>
+              <a:rPr lang="en-GB" dirty="0" err="1"/>
+              <a:t>salvată</a:t>
+            </a:r>
+            <a:r>
+              <a:rPr lang="en-GB" dirty="0"/>
+              <a:t> data </a:t>
+            </a:r>
+            <a:r>
+              <a:rPr lang="en-GB" dirty="0" err="1"/>
+              <a:t>creării</a:t>
+            </a:r>
+            <a:r>
+              <a:rPr lang="en-GB" dirty="0"/>
+              <a:t> </a:t>
+            </a:r>
+            <a:r>
+              <a:rPr lang="en-GB" dirty="0" err="1"/>
+              <a:t>pentru</a:t>
+            </a:r>
+            <a:r>
+              <a:rPr lang="en-GB" dirty="0"/>
+              <a:t> a face </a:t>
+            </a:r>
+            <a:r>
+              <a:rPr lang="en-GB" dirty="0" err="1"/>
+              <a:t>mai</a:t>
+            </a:r>
+            <a:r>
+              <a:rPr lang="en-GB" dirty="0"/>
+              <a:t> </a:t>
+            </a:r>
+            <a:r>
+              <a:rPr lang="en-GB" dirty="0" err="1"/>
+              <a:t>facilă</a:t>
+            </a:r>
+            <a:r>
+              <a:rPr lang="en-GB" dirty="0"/>
+              <a:t> </a:t>
+            </a:r>
+            <a:r>
+              <a:rPr lang="en-GB" dirty="0" err="1"/>
+              <a:t>sortarea</a:t>
+            </a:r>
+            <a:r>
+              <a:rPr lang="en-GB" dirty="0"/>
+              <a:t> </a:t>
+            </a:r>
+            <a:r>
+              <a:rPr lang="en-GB" dirty="0" err="1"/>
+              <a:t>sau</a:t>
+            </a:r>
+            <a:r>
+              <a:rPr lang="en-GB" dirty="0"/>
+              <a:t> </a:t>
+            </a:r>
+            <a:r>
+              <a:rPr lang="en-GB" dirty="0" err="1"/>
+              <a:t>criteriile</a:t>
+            </a:r>
+            <a:r>
+              <a:rPr lang="en-GB" dirty="0"/>
+              <a:t> de </a:t>
+            </a:r>
+            <a:r>
+              <a:rPr lang="en-GB" dirty="0" err="1"/>
+              <a:t>menținere</a:t>
+            </a:r>
+            <a:r>
+              <a:rPr lang="en-GB" dirty="0"/>
+              <a:t> a </a:t>
+            </a:r>
+            <a:r>
+              <a:rPr lang="en-GB" dirty="0" err="1"/>
+              <a:t>unei</a:t>
+            </a:r>
+            <a:r>
+              <a:rPr lang="en-GB" dirty="0"/>
+              <a:t> </a:t>
+            </a:r>
+            <a:r>
+              <a:rPr lang="en-GB" dirty="0" err="1"/>
+              <a:t>evidențe</a:t>
+            </a:r>
+            <a:endParaRPr lang="en-GB" dirty="0"/>
+          </a:p>
+          <a:p>
+            <a:r>
+              <a:rPr lang="en-GB" dirty="0"/>
+              <a:t>a </a:t>
+            </a:r>
+            <a:r>
+              <a:rPr lang="en-GB" dirty="0" err="1"/>
+              <a:t>utilizatorului</a:t>
+            </a:r>
+            <a:r>
+              <a:rPr lang="en-GB" dirty="0"/>
+              <a:t>. </a:t>
+            </a:r>
+            <a:r>
+              <a:rPr lang="en-GB" dirty="0" err="1"/>
+              <a:t>Partea</a:t>
+            </a:r>
+            <a:r>
+              <a:rPr lang="en-GB" dirty="0"/>
+              <a:t> de frontend </a:t>
+            </a:r>
+            <a:r>
+              <a:rPr lang="en-GB" dirty="0" err="1"/>
+              <a:t>constă</a:t>
+            </a:r>
+            <a:r>
+              <a:rPr lang="en-GB" dirty="0"/>
+              <a:t> </a:t>
+            </a:r>
+            <a:r>
+              <a:rPr lang="en-GB" dirty="0" err="1"/>
+              <a:t>dintr</a:t>
+            </a:r>
+            <a:r>
+              <a:rPr lang="en-GB" dirty="0"/>
+              <a:t>-un index, </a:t>
+            </a:r>
+            <a:r>
+              <a:rPr lang="en-GB" dirty="0" err="1"/>
+              <a:t>unde</a:t>
+            </a:r>
+            <a:r>
+              <a:rPr lang="en-GB" dirty="0"/>
+              <a:t> </a:t>
+            </a:r>
+            <a:r>
+              <a:rPr lang="en-GB" dirty="0" err="1"/>
+              <a:t>avem</a:t>
+            </a:r>
+            <a:r>
+              <a:rPr lang="en-GB" dirty="0"/>
+              <a:t> </a:t>
+            </a:r>
+            <a:r>
+              <a:rPr lang="en-GB" dirty="0" err="1"/>
+              <a:t>formularul</a:t>
+            </a:r>
+            <a:r>
+              <a:rPr lang="en-GB" dirty="0"/>
+              <a:t> de </a:t>
+            </a:r>
+            <a:r>
+              <a:rPr lang="en-GB" dirty="0" err="1"/>
+              <a:t>trimitere</a:t>
+            </a:r>
+            <a:r>
+              <a:rPr lang="en-GB" dirty="0"/>
+              <a:t>, </a:t>
+            </a:r>
+            <a:r>
+              <a:rPr lang="en-GB" dirty="0" err="1"/>
+              <a:t>și</a:t>
+            </a:r>
+            <a:r>
+              <a:rPr lang="en-GB" dirty="0"/>
+              <a:t> </a:t>
+            </a:r>
+            <a:r>
+              <a:rPr lang="en-GB" dirty="0" err="1"/>
+              <a:t>unde</a:t>
+            </a:r>
+            <a:r>
+              <a:rPr lang="en-GB" dirty="0"/>
+              <a:t> </a:t>
+            </a:r>
+            <a:r>
+              <a:rPr lang="en-GB" dirty="0" err="1"/>
+              <a:t>putem</a:t>
+            </a:r>
+            <a:r>
+              <a:rPr lang="en-GB" dirty="0"/>
+              <a:t> </a:t>
+            </a:r>
+            <a:r>
+              <a:rPr lang="en-GB" dirty="0" err="1"/>
+              <a:t>vedea</a:t>
+            </a:r>
+            <a:r>
+              <a:rPr lang="en-GB" dirty="0"/>
+              <a:t> </a:t>
+            </a:r>
+            <a:r>
+              <a:rPr lang="en-GB" dirty="0" err="1"/>
+              <a:t>notițele</a:t>
+            </a:r>
+            <a:r>
+              <a:rPr lang="en-GB" dirty="0"/>
+              <a:t> din </a:t>
+            </a:r>
+            <a:r>
+              <a:rPr lang="en-GB" dirty="0" err="1"/>
+              <a:t>baza</a:t>
+            </a:r>
+            <a:r>
+              <a:rPr lang="en-GB" dirty="0"/>
+              <a:t> de date. </a:t>
+            </a:r>
+            <a:r>
+              <a:rPr lang="en-GB" dirty="0" err="1"/>
+              <a:t>Restul</a:t>
+            </a:r>
+            <a:r>
+              <a:rPr lang="en-GB" dirty="0"/>
+              <a:t> </a:t>
+            </a:r>
+            <a:r>
+              <a:rPr lang="en-GB" dirty="0" err="1"/>
+              <a:t>fișierelor</a:t>
+            </a:r>
+            <a:endParaRPr lang="en-GB" dirty="0"/>
+          </a:p>
+          <a:p>
+            <a:r>
+              <a:rPr lang="en-GB" dirty="0" err="1"/>
+              <a:t>reprezintă</a:t>
+            </a:r>
+            <a:r>
+              <a:rPr lang="en-GB" dirty="0"/>
+              <a:t> </a:t>
+            </a:r>
+            <a:r>
+              <a:rPr lang="en-GB" dirty="0" err="1"/>
+              <a:t>acțiuni</a:t>
+            </a:r>
+            <a:r>
+              <a:rPr lang="en-GB" dirty="0"/>
+              <a:t> de tip CRUD, (</a:t>
+            </a:r>
+            <a:r>
+              <a:rPr lang="en-GB" dirty="0" err="1"/>
+              <a:t>putem</a:t>
+            </a:r>
+            <a:r>
+              <a:rPr lang="en-GB" dirty="0"/>
+              <a:t> </a:t>
+            </a:r>
+            <a:r>
+              <a:rPr lang="en-GB" dirty="0" err="1"/>
+              <a:t>crea</a:t>
+            </a:r>
+            <a:r>
+              <a:rPr lang="en-GB" dirty="0"/>
+              <a:t> </a:t>
+            </a:r>
+            <a:r>
+              <a:rPr lang="en-GB" dirty="0" err="1"/>
+              <a:t>notiță</a:t>
+            </a:r>
+            <a:r>
+              <a:rPr lang="en-GB" dirty="0"/>
+              <a:t> </a:t>
+            </a:r>
+            <a:r>
+              <a:rPr lang="en-GB" dirty="0" err="1"/>
+              <a:t>în</a:t>
+            </a:r>
+            <a:r>
+              <a:rPr lang="en-GB" dirty="0"/>
+              <a:t> </a:t>
+            </a:r>
+            <a:r>
+              <a:rPr lang="en-GB" dirty="0" err="1"/>
+              <a:t>baza</a:t>
+            </a:r>
+            <a:r>
+              <a:rPr lang="en-GB" dirty="0"/>
+              <a:t> de date, </a:t>
+            </a:r>
+            <a:r>
+              <a:rPr lang="en-GB" dirty="0" err="1"/>
+              <a:t>putem</a:t>
+            </a:r>
+            <a:r>
+              <a:rPr lang="en-GB" dirty="0"/>
+              <a:t> </a:t>
+            </a:r>
+            <a:r>
+              <a:rPr lang="en-GB" dirty="0" err="1"/>
+              <a:t>citi</a:t>
+            </a:r>
+            <a:r>
+              <a:rPr lang="en-GB" dirty="0"/>
+              <a:t> </a:t>
+            </a:r>
+            <a:r>
+              <a:rPr lang="en-GB" dirty="0" err="1"/>
+              <a:t>toate</a:t>
+            </a:r>
+            <a:r>
+              <a:rPr lang="en-GB" dirty="0"/>
+              <a:t> </a:t>
+            </a:r>
+            <a:r>
+              <a:rPr lang="en-GB" dirty="0" err="1"/>
+              <a:t>notițele</a:t>
+            </a:r>
+            <a:r>
+              <a:rPr lang="en-GB" dirty="0"/>
+              <a:t>, </a:t>
+            </a:r>
+            <a:r>
+              <a:rPr lang="en-GB" dirty="0" err="1"/>
+              <a:t>putem</a:t>
+            </a:r>
+            <a:r>
+              <a:rPr lang="en-GB" dirty="0"/>
+              <a:t> </a:t>
+            </a:r>
+            <a:r>
+              <a:rPr lang="en-GB" dirty="0" err="1"/>
+              <a:t>edita</a:t>
+            </a:r>
+            <a:r>
+              <a:rPr lang="en-GB" dirty="0"/>
+              <a:t> </a:t>
+            </a:r>
+            <a:r>
+              <a:rPr lang="en-GB" dirty="0" err="1"/>
+              <a:t>notițe</a:t>
+            </a:r>
+            <a:r>
+              <a:rPr lang="en-GB" dirty="0"/>
+              <a:t> </a:t>
+            </a:r>
+            <a:r>
+              <a:rPr lang="en-GB" dirty="0" err="1"/>
+              <a:t>într</a:t>
+            </a:r>
+            <a:r>
+              <a:rPr lang="en-GB" dirty="0"/>
+              <a:t>-o </a:t>
+            </a:r>
+            <a:r>
+              <a:rPr lang="en-GB" dirty="0" err="1"/>
+              <a:t>pagină</a:t>
+            </a:r>
+            <a:r>
+              <a:rPr lang="en-GB" dirty="0"/>
+              <a:t> </a:t>
+            </a:r>
+            <a:r>
+              <a:rPr lang="en-GB" dirty="0" err="1"/>
+              <a:t>separată</a:t>
+            </a:r>
+            <a:r>
+              <a:rPr lang="en-GB" dirty="0"/>
+              <a:t>, </a:t>
+            </a:r>
+            <a:r>
+              <a:rPr lang="en-GB" dirty="0" err="1"/>
+              <a:t>și</a:t>
+            </a:r>
+            <a:r>
+              <a:rPr lang="en-GB" dirty="0"/>
+              <a:t> </a:t>
+            </a:r>
+            <a:r>
+              <a:rPr lang="en-GB" dirty="0" err="1"/>
+              <a:t>sterge</a:t>
+            </a:r>
+            <a:r>
+              <a:rPr lang="en-GB" dirty="0"/>
+              <a:t> o </a:t>
+            </a:r>
+            <a:r>
+              <a:rPr lang="en-GB" dirty="0" err="1"/>
+              <a:t>notiță</a:t>
+            </a:r>
+            <a:r>
+              <a:rPr lang="en-GB" dirty="0"/>
+              <a:t>).</a:t>
+            </a:r>
+          </a:p>
+          <a:p>
+            <a:r>
+              <a:rPr lang="en-GB" dirty="0" err="1"/>
+              <a:t>Avem</a:t>
+            </a:r>
+            <a:r>
+              <a:rPr lang="en-GB" dirty="0"/>
+              <a:t> </a:t>
+            </a:r>
+            <a:r>
+              <a:rPr lang="en-GB" dirty="0" err="1"/>
+              <a:t>în</a:t>
+            </a:r>
+            <a:r>
+              <a:rPr lang="en-GB" dirty="0"/>
+              <a:t> </a:t>
+            </a:r>
+            <a:r>
+              <a:rPr lang="en-GB" dirty="0" err="1"/>
+              <a:t>src</a:t>
+            </a:r>
+            <a:r>
+              <a:rPr lang="en-GB" dirty="0"/>
+              <a:t> </a:t>
+            </a:r>
+            <a:r>
+              <a:rPr lang="en-GB" dirty="0" err="1"/>
+              <a:t>fișierele</a:t>
+            </a:r>
+            <a:r>
+              <a:rPr lang="en-GB" dirty="0"/>
+              <a:t> </a:t>
+            </a:r>
+            <a:r>
+              <a:rPr lang="en-GB" dirty="0" err="1"/>
+              <a:t>index.php</a:t>
+            </a:r>
+            <a:r>
+              <a:rPr lang="en-GB" dirty="0"/>
+              <a:t>, </a:t>
+            </a:r>
+            <a:r>
+              <a:rPr lang="en-GB" dirty="0" err="1"/>
+              <a:t>delete.php</a:t>
+            </a:r>
+            <a:r>
+              <a:rPr lang="en-GB" dirty="0"/>
+              <a:t>, </a:t>
+            </a:r>
+            <a:r>
+              <a:rPr lang="en-GB" dirty="0" err="1"/>
+              <a:t>edit.php</a:t>
+            </a:r>
+            <a:r>
+              <a:rPr lang="en-GB" dirty="0"/>
+              <a:t>, </a:t>
+            </a:r>
+            <a:r>
+              <a:rPr lang="en-GB" dirty="0" err="1"/>
+              <a:t>insert.php</a:t>
+            </a:r>
+            <a:r>
+              <a:rPr lang="en-GB" dirty="0"/>
+              <a:t>. </a:t>
+            </a:r>
+            <a:r>
+              <a:rPr lang="en-GB" dirty="0" err="1"/>
+              <a:t>În</a:t>
+            </a:r>
+            <a:r>
+              <a:rPr lang="en-GB" dirty="0"/>
+              <a:t> tests </a:t>
+            </a:r>
+            <a:r>
+              <a:rPr lang="en-GB" dirty="0" err="1"/>
+              <a:t>avem</a:t>
+            </a:r>
+            <a:r>
+              <a:rPr lang="en-GB" dirty="0"/>
+              <a:t>, </a:t>
+            </a:r>
+            <a:r>
+              <a:rPr lang="en-GB" dirty="0" err="1"/>
+              <a:t>deleteTest.php</a:t>
+            </a:r>
+            <a:r>
+              <a:rPr lang="en-GB" dirty="0"/>
+              <a:t>, </a:t>
+            </a:r>
+            <a:r>
+              <a:rPr lang="en-GB" dirty="0" err="1"/>
+              <a:t>editTest.php</a:t>
+            </a:r>
+            <a:r>
+              <a:rPr lang="en-GB" dirty="0"/>
+              <a:t>, </a:t>
+            </a:r>
+            <a:r>
+              <a:rPr lang="en-GB" dirty="0" err="1"/>
+              <a:t>indexTest.php</a:t>
+            </a:r>
+            <a:r>
+              <a:rPr lang="en-GB" dirty="0"/>
+              <a:t>, </a:t>
+            </a:r>
+            <a:r>
+              <a:rPr lang="en-GB" dirty="0" err="1"/>
+              <a:t>insertTest.php</a:t>
+            </a:r>
+            <a:r>
+              <a:rPr lang="en-GB" dirty="0"/>
+              <a:t>, </a:t>
+            </a:r>
+            <a:r>
+              <a:rPr lang="en-GB" dirty="0" err="1"/>
+              <a:t>unde</a:t>
+            </a:r>
+            <a:r>
+              <a:rPr lang="en-GB" dirty="0"/>
+              <a:t> la </a:t>
+            </a:r>
+            <a:r>
+              <a:rPr lang="en-GB" dirty="0" err="1"/>
+              <a:t>testul</a:t>
+            </a:r>
+            <a:r>
+              <a:rPr lang="en-GB" dirty="0"/>
+              <a:t> de delete</a:t>
+            </a:r>
+          </a:p>
+          <a:p>
+            <a:r>
+              <a:rPr lang="en-GB" dirty="0" err="1"/>
+              <a:t>avem</a:t>
+            </a:r>
+            <a:r>
+              <a:rPr lang="en-GB" dirty="0"/>
+              <a:t> 2 </a:t>
+            </a:r>
+            <a:r>
+              <a:rPr lang="en-GB" dirty="0" err="1"/>
+              <a:t>scenarii</a:t>
+            </a:r>
+            <a:r>
+              <a:rPr lang="en-GB" dirty="0"/>
+              <a:t>. </a:t>
+            </a:r>
+            <a:r>
+              <a:rPr lang="en-GB" dirty="0" err="1"/>
+              <a:t>Vom</a:t>
+            </a:r>
+            <a:r>
+              <a:rPr lang="en-GB" dirty="0"/>
+              <a:t> </a:t>
+            </a:r>
+            <a:r>
+              <a:rPr lang="en-GB" dirty="0" err="1"/>
+              <a:t>începe</a:t>
+            </a:r>
+            <a:r>
+              <a:rPr lang="en-GB" dirty="0"/>
+              <a:t> </a:t>
+            </a:r>
+            <a:r>
+              <a:rPr lang="en-GB" dirty="0" err="1"/>
+              <a:t>prin</a:t>
+            </a:r>
+            <a:r>
+              <a:rPr lang="en-GB" dirty="0"/>
+              <a:t> a </a:t>
+            </a:r>
+            <a:r>
+              <a:rPr lang="en-GB" dirty="0" err="1"/>
+              <a:t>prezenta</a:t>
+            </a:r>
+            <a:r>
+              <a:rPr lang="en-GB" dirty="0"/>
+              <a:t> cum am </a:t>
+            </a:r>
+            <a:r>
+              <a:rPr lang="en-GB" dirty="0" err="1"/>
+              <a:t>folosit</a:t>
+            </a:r>
+            <a:r>
+              <a:rPr lang="en-GB" dirty="0"/>
+              <a:t> </a:t>
+            </a:r>
+            <a:r>
+              <a:rPr lang="en-GB" dirty="0" err="1"/>
+              <a:t>biblioteca</a:t>
+            </a:r>
+            <a:r>
+              <a:rPr lang="en-GB" dirty="0"/>
+              <a:t>, </a:t>
+            </a:r>
+            <a:r>
+              <a:rPr lang="en-GB" dirty="0" err="1"/>
+              <a:t>după</a:t>
+            </a:r>
+            <a:r>
+              <a:rPr lang="en-GB" dirty="0"/>
+              <a:t> care </a:t>
+            </a:r>
+            <a:r>
+              <a:rPr lang="en-GB" dirty="0" err="1"/>
+              <a:t>vom</a:t>
+            </a:r>
+            <a:r>
+              <a:rPr lang="en-GB" dirty="0"/>
+              <a:t> </a:t>
+            </a:r>
+            <a:r>
+              <a:rPr lang="en-GB" dirty="0" err="1"/>
+              <a:t>explica</a:t>
+            </a:r>
+            <a:r>
+              <a:rPr lang="en-GB" dirty="0"/>
+              <a:t> </a:t>
+            </a:r>
+            <a:r>
+              <a:rPr lang="en-GB" dirty="0" err="1"/>
+              <a:t>fiecare</a:t>
+            </a:r>
+            <a:r>
+              <a:rPr lang="en-GB" dirty="0"/>
+              <a:t> script in </a:t>
+            </a:r>
+            <a:r>
+              <a:rPr lang="en-GB" dirty="0" err="1"/>
+              <a:t>parte</a:t>
+            </a:r>
+            <a:r>
+              <a:rPr lang="en-GB" dirty="0"/>
+              <a:t>, de </a:t>
+            </a:r>
+            <a:r>
+              <a:rPr lang="en-GB" dirty="0" err="1"/>
+              <a:t>ce</a:t>
+            </a:r>
+            <a:r>
+              <a:rPr lang="en-GB" dirty="0"/>
+              <a:t> am ales </a:t>
+            </a:r>
+            <a:r>
+              <a:rPr lang="en-GB" dirty="0" err="1"/>
+              <a:t>aceste</a:t>
+            </a:r>
+            <a:r>
+              <a:rPr lang="en-GB" dirty="0"/>
+              <a:t> </a:t>
+            </a:r>
+            <a:r>
+              <a:rPr lang="en-GB" dirty="0" err="1"/>
+              <a:t>scenarii</a:t>
+            </a:r>
+            <a:r>
+              <a:rPr lang="en-GB" dirty="0"/>
+              <a:t>, </a:t>
+            </a:r>
+            <a:r>
+              <a:rPr lang="en-GB" dirty="0" err="1"/>
+              <a:t>și</a:t>
+            </a:r>
+            <a:r>
+              <a:rPr lang="en-GB" dirty="0"/>
+              <a:t> </a:t>
+            </a:r>
+            <a:r>
+              <a:rPr lang="en-GB" dirty="0" err="1"/>
+              <a:t>ce</a:t>
+            </a:r>
+            <a:r>
+              <a:rPr lang="en-GB" dirty="0"/>
+              <a:t> am </a:t>
+            </a:r>
+            <a:r>
+              <a:rPr lang="en-GB" dirty="0" err="1"/>
+              <a:t>întâmpinat</a:t>
+            </a:r>
+            <a:endParaRPr lang="en-GB" dirty="0"/>
+          </a:p>
+          <a:p>
+            <a:r>
+              <a:rPr lang="en-GB" dirty="0" err="1"/>
+              <a:t>în</a:t>
+            </a:r>
+            <a:r>
+              <a:rPr lang="en-GB" dirty="0"/>
+              <a:t> </a:t>
+            </a:r>
+            <a:r>
+              <a:rPr lang="en-GB" dirty="0" err="1"/>
+              <a:t>crearea</a:t>
+            </a:r>
+            <a:r>
+              <a:rPr lang="en-GB" dirty="0"/>
+              <a:t> </a:t>
+            </a:r>
+            <a:r>
+              <a:rPr lang="en-GB" dirty="0" err="1"/>
+              <a:t>designului</a:t>
+            </a:r>
+            <a:r>
+              <a:rPr lang="en-GB" dirty="0"/>
+              <a:t>.</a:t>
+            </a:r>
+          </a:p>
+          <a:p>
+            <a:br>
+              <a:rPr lang="en-GB" dirty="0"/>
+            </a:br>
+            <a:endParaRPr lang="en-GB" dirty="0"/>
+          </a:p>
+          <a:p>
+            <a:endParaRPr lang="en-GB" dirty="0"/>
+          </a:p>
+        </p:txBody>
+      </p:sp>
+    </p:spTree>
+    <p:extLst>
+      <p:ext uri="{BB962C8B-B14F-4D97-AF65-F5344CB8AC3E}">
+        <p14:creationId xmlns:p14="http://schemas.microsoft.com/office/powerpoint/2010/main" val="3025625124"/>
+      </p:ext>
+    </p:extLst>
+  </p:cSld>
+  <p:clrMapOvr>
+    <a:masterClrMapping/>
+  </p:clrMapOvr>
+</p:sld>
+</file>
+
+<file path=ppt/slides/slide11.xml><?xml version="1.0" encoding="utf-8"?>
+<p:sld xmlns:a="http://schemas.openxmlformats.org/drawingml/2006/main" xmlns:r="http://schemas.openxmlformats.org/officeDocument/2006/relationships" xmlns:p="http://schemas.openxmlformats.org/presentationml/2006/main">
+  <p:cSld>
+    <p:spTree>
+      <p:nvGrpSpPr>
+        <p:cNvPr id="1" name=""/>
+        <p:cNvGrpSpPr/>
+        <p:nvPr/>
+      </p:nvGrpSpPr>
+      <p:grpSpPr>
+        <a:xfrm>
+          <a:off x="0" y="0"/>
+          <a:ext cx="0" cy="0"/>
+          <a:chOff x="0" y="0"/>
+          <a:chExt cx="0" cy="0"/>
+        </a:xfrm>
+      </p:grpSpPr>
+      <p:sp>
+        <p:nvSpPr>
+          <p:cNvPr id="2" name="Title 1">
+            <a:extLst>
+              <a:ext uri="{FF2B5EF4-FFF2-40B4-BE49-F238E27FC236}">
+                <a16:creationId xmlns:a16="http://schemas.microsoft.com/office/drawing/2014/main" id="{41D84AD3-D15B-4565-AFD3-830DC173DA6B}"/>
+              </a:ext>
+            </a:extLst>
+          </p:cNvPr>
+          <p:cNvSpPr>
+            <a:spLocks noGrp="1"/>
+          </p:cNvSpPr>
+          <p:nvPr>
+            <p:ph type="title"/>
+          </p:nvPr>
+        </p:nvSpPr>
+        <p:spPr/>
+        <p:txBody>
+          <a:bodyPr/>
+          <a:lstStyle/>
+          <a:p>
+            <a:r>
+              <a:rPr lang="en-US" dirty="0" err="1"/>
+              <a:t>Implementare</a:t>
+            </a:r>
+            <a:endParaRPr lang="en-GB" dirty="0"/>
+          </a:p>
+        </p:txBody>
+      </p:sp>
+      <p:sp>
+        <p:nvSpPr>
+          <p:cNvPr id="3" name="Content Placeholder 2">
+            <a:extLst>
+              <a:ext uri="{FF2B5EF4-FFF2-40B4-BE49-F238E27FC236}">
+                <a16:creationId xmlns:a16="http://schemas.microsoft.com/office/drawing/2014/main" id="{FD422E11-78E3-4A31-BA9F-C6FA183F22D5}"/>
+              </a:ext>
+            </a:extLst>
+          </p:cNvPr>
+          <p:cNvSpPr>
+            <a:spLocks noGrp="1"/>
+          </p:cNvSpPr>
+          <p:nvPr>
+            <p:ph idx="1"/>
+          </p:nvPr>
+        </p:nvSpPr>
+        <p:spPr/>
+        <p:txBody>
+          <a:bodyPr/>
+          <a:lstStyle/>
+          <a:p>
+            <a:r>
+              <a:rPr lang="en-GB" dirty="0"/>
+              <a:t>La </a:t>
+            </a:r>
+            <a:r>
+              <a:rPr lang="en-GB" dirty="0" err="1"/>
+              <a:t>începutul</a:t>
+            </a:r>
+            <a:r>
+              <a:rPr lang="en-GB" dirty="0"/>
+              <a:t> </a:t>
+            </a:r>
+            <a:r>
+              <a:rPr lang="en-GB" dirty="0" err="1"/>
+              <a:t>fiecărui</a:t>
+            </a:r>
+            <a:r>
+              <a:rPr lang="en-GB" dirty="0"/>
+              <a:t> script, </a:t>
+            </a:r>
+            <a:r>
+              <a:rPr lang="en-GB" dirty="0" err="1"/>
+              <a:t>includem</a:t>
+            </a:r>
+            <a:r>
+              <a:rPr lang="en-GB" dirty="0"/>
+              <a:t> </a:t>
+            </a:r>
+            <a:r>
+              <a:rPr lang="en-GB" dirty="0" err="1"/>
+              <a:t>biblioteca</a:t>
+            </a:r>
+            <a:r>
+              <a:rPr lang="en-GB" dirty="0"/>
+              <a:t> </a:t>
+            </a:r>
+            <a:r>
+              <a:rPr lang="en-GB" dirty="0" err="1"/>
+              <a:t>PHPUnit</a:t>
+            </a:r>
+            <a:r>
+              <a:rPr lang="en-GB" dirty="0"/>
+              <a:t> </a:t>
+            </a:r>
+            <a:r>
+              <a:rPr lang="en-GB" dirty="0" err="1"/>
+              <a:t>în</a:t>
+            </a:r>
+            <a:r>
+              <a:rPr lang="en-GB" dirty="0"/>
+              <a:t> </a:t>
+            </a:r>
+            <a:r>
+              <a:rPr lang="en-GB" dirty="0" err="1"/>
+              <a:t>felul</a:t>
+            </a:r>
+            <a:r>
+              <a:rPr lang="en-GB" dirty="0"/>
+              <a:t> </a:t>
+            </a:r>
+            <a:r>
+              <a:rPr lang="en-GB" dirty="0" err="1"/>
+              <a:t>acesta</a:t>
+            </a:r>
+            <a:r>
+              <a:rPr lang="en-GB" dirty="0"/>
+              <a:t> "use </a:t>
+            </a:r>
+            <a:r>
+              <a:rPr lang="en-GB" dirty="0" err="1"/>
+              <a:t>PHPUnit</a:t>
+            </a:r>
+            <a:r>
+              <a:rPr lang="en-GB" dirty="0"/>
+              <a:t>\Framework\</a:t>
+            </a:r>
+            <a:r>
+              <a:rPr lang="en-GB" dirty="0" err="1"/>
+              <a:t>TestCase</a:t>
+            </a:r>
+            <a:r>
+              <a:rPr lang="en-GB" dirty="0"/>
+              <a:t>;". </a:t>
+            </a:r>
+            <a:r>
+              <a:rPr lang="en-GB" dirty="0" err="1"/>
+              <a:t>Structura</a:t>
+            </a:r>
+            <a:r>
+              <a:rPr lang="en-GB" dirty="0"/>
+              <a:t> </a:t>
+            </a:r>
+            <a:r>
+              <a:rPr lang="en-GB" dirty="0" err="1"/>
+              <a:t>fiind</a:t>
+            </a:r>
+            <a:r>
+              <a:rPr lang="en-GB" dirty="0"/>
+              <a:t> </a:t>
+            </a:r>
+            <a:r>
+              <a:rPr lang="en-GB" dirty="0" err="1"/>
+              <a:t>similară</a:t>
+            </a:r>
+            <a:r>
+              <a:rPr lang="en-GB" dirty="0"/>
+              <a:t> la </a:t>
+            </a:r>
+            <a:r>
+              <a:rPr lang="en-GB" dirty="0" err="1"/>
+              <a:t>fiecare</a:t>
+            </a:r>
+            <a:r>
+              <a:rPr lang="en-GB" dirty="0"/>
+              <a:t> test, face </a:t>
+            </a:r>
+            <a:r>
+              <a:rPr lang="en-GB" dirty="0" err="1"/>
+              <a:t>posibilă</a:t>
+            </a:r>
+            <a:r>
+              <a:rPr lang="en-GB" dirty="0"/>
+              <a:t> </a:t>
+            </a:r>
+            <a:r>
+              <a:rPr lang="en-GB" dirty="0" err="1"/>
+              <a:t>crearea</a:t>
+            </a:r>
+            <a:r>
+              <a:rPr lang="en-GB" dirty="0"/>
+              <a:t> </a:t>
+            </a:r>
+            <a:r>
+              <a:rPr lang="en-GB" dirty="0" err="1"/>
+              <a:t>unor</a:t>
+            </a:r>
+            <a:r>
+              <a:rPr lang="en-GB" dirty="0"/>
+              <a:t> scaffolds </a:t>
+            </a:r>
+            <a:r>
+              <a:rPr lang="en-GB" dirty="0" err="1"/>
+              <a:t>plecând</a:t>
+            </a:r>
+            <a:r>
+              <a:rPr lang="en-GB" dirty="0"/>
+              <a:t> de la </a:t>
+            </a:r>
+            <a:r>
+              <a:rPr lang="en-GB" dirty="0" err="1"/>
+              <a:t>acelasi</a:t>
+            </a:r>
+            <a:r>
+              <a:rPr lang="en-GB" dirty="0"/>
+              <a:t> template, din moment </a:t>
+            </a:r>
+            <a:r>
+              <a:rPr lang="en-GB" dirty="0" err="1"/>
+              <a:t>ce</a:t>
+            </a:r>
+            <a:r>
+              <a:rPr lang="en-GB" dirty="0"/>
+              <a:t> nu sunt </a:t>
+            </a:r>
+            <a:r>
+              <a:rPr lang="en-GB" dirty="0" err="1"/>
+              <a:t>dependințe</a:t>
+            </a:r>
+            <a:r>
+              <a:rPr lang="en-GB" dirty="0"/>
+              <a:t> </a:t>
+            </a:r>
+            <a:r>
+              <a:rPr lang="en-GB" dirty="0" err="1"/>
+              <a:t>diferite</a:t>
+            </a:r>
+            <a:r>
+              <a:rPr lang="en-GB" dirty="0"/>
+              <a:t>, </a:t>
+            </a:r>
+            <a:r>
+              <a:rPr lang="en-GB" dirty="0" err="1"/>
+              <a:t>dar</a:t>
+            </a:r>
+            <a:r>
+              <a:rPr lang="en-GB" dirty="0"/>
+              <a:t> </a:t>
+            </a:r>
+            <a:r>
+              <a:rPr lang="en-GB" dirty="0" err="1"/>
+              <a:t>proiectul</a:t>
+            </a:r>
+            <a:r>
+              <a:rPr lang="en-GB" dirty="0"/>
+              <a:t> </a:t>
+            </a:r>
+            <a:r>
+              <a:rPr lang="en-GB" dirty="0" err="1"/>
+              <a:t>nefiind</a:t>
+            </a:r>
+            <a:r>
+              <a:rPr lang="en-GB" dirty="0"/>
+              <a:t> </a:t>
+            </a:r>
+            <a:r>
+              <a:rPr lang="en-GB" dirty="0" err="1"/>
+              <a:t>unul</a:t>
+            </a:r>
+            <a:r>
+              <a:rPr lang="en-GB" dirty="0"/>
+              <a:t> </a:t>
+            </a:r>
+            <a:r>
+              <a:rPr lang="en-GB" dirty="0" err="1"/>
+              <a:t>amplu</a:t>
+            </a:r>
+            <a:r>
+              <a:rPr lang="en-GB" dirty="0"/>
+              <a:t> nu am </a:t>
+            </a:r>
+            <a:r>
+              <a:rPr lang="en-GB" dirty="0" err="1"/>
+              <a:t>combătut</a:t>
+            </a:r>
+            <a:r>
+              <a:rPr lang="en-GB" dirty="0"/>
+              <a:t> boilerplate code.</a:t>
+            </a:r>
+          </a:p>
+          <a:p>
+            <a:r>
+              <a:rPr lang="en-GB" dirty="0" err="1"/>
+              <a:t>Fiecare</a:t>
+            </a:r>
+            <a:r>
+              <a:rPr lang="en-GB" dirty="0"/>
+              <a:t> </a:t>
+            </a:r>
+            <a:r>
+              <a:rPr lang="en-GB" dirty="0" err="1"/>
+              <a:t>clasă</a:t>
+            </a:r>
+            <a:r>
+              <a:rPr lang="en-GB" dirty="0"/>
+              <a:t> de test </a:t>
+            </a:r>
+            <a:r>
+              <a:rPr lang="en-GB" dirty="0" err="1"/>
+              <a:t>moștenește</a:t>
+            </a:r>
+            <a:r>
+              <a:rPr lang="en-GB" dirty="0"/>
+              <a:t> </a:t>
+            </a:r>
+            <a:r>
+              <a:rPr lang="en-GB" dirty="0" err="1"/>
+              <a:t>clasa</a:t>
+            </a:r>
+            <a:r>
+              <a:rPr lang="en-GB" dirty="0"/>
+              <a:t> </a:t>
+            </a:r>
+            <a:r>
+              <a:rPr lang="en-GB" dirty="0" err="1"/>
+              <a:t>TestCase</a:t>
+            </a:r>
+            <a:r>
+              <a:rPr lang="en-GB" dirty="0"/>
+              <a:t>, </a:t>
+            </a:r>
+            <a:r>
+              <a:rPr lang="en-GB" dirty="0" err="1"/>
+              <a:t>deci</a:t>
+            </a:r>
+            <a:r>
+              <a:rPr lang="en-GB" dirty="0"/>
+              <a:t> implicit </a:t>
+            </a:r>
+            <a:r>
+              <a:rPr lang="en-GB" dirty="0" err="1"/>
+              <a:t>și</a:t>
+            </a:r>
+            <a:r>
+              <a:rPr lang="en-GB" dirty="0"/>
+              <a:t> </a:t>
+            </a:r>
+            <a:r>
+              <a:rPr lang="en-GB" dirty="0" err="1"/>
+              <a:t>metodele</a:t>
+            </a:r>
+            <a:r>
+              <a:rPr lang="en-GB" dirty="0"/>
+              <a:t> sale. </a:t>
+            </a:r>
+            <a:r>
+              <a:rPr lang="en-GB" dirty="0" err="1"/>
+              <a:t>În</a:t>
+            </a:r>
+            <a:r>
+              <a:rPr lang="en-GB" dirty="0"/>
+              <a:t> </a:t>
+            </a:r>
+            <a:r>
+              <a:rPr lang="en-GB" dirty="0" err="1"/>
+              <a:t>fiecare</a:t>
+            </a:r>
+            <a:r>
+              <a:rPr lang="en-GB" dirty="0"/>
+              <a:t> </a:t>
+            </a:r>
+            <a:r>
+              <a:rPr lang="en-GB" dirty="0" err="1"/>
+              <a:t>caz</a:t>
+            </a:r>
+            <a:r>
+              <a:rPr lang="en-GB" dirty="0"/>
+              <a:t> am </a:t>
+            </a:r>
+            <a:r>
+              <a:rPr lang="en-GB" dirty="0" err="1"/>
+              <a:t>instanțiat</a:t>
+            </a:r>
+            <a:r>
+              <a:rPr lang="en-GB" dirty="0"/>
+              <a:t> cu </a:t>
+            </a:r>
+            <a:r>
+              <a:rPr lang="en-GB" dirty="0" err="1"/>
+              <a:t>metode</a:t>
+            </a:r>
+            <a:r>
+              <a:rPr lang="en-GB" dirty="0"/>
+              <a:t> private </a:t>
+            </a:r>
+            <a:r>
+              <a:rPr lang="en-GB" dirty="0" err="1"/>
+              <a:t>conexiunea</a:t>
+            </a:r>
+            <a:r>
+              <a:rPr lang="en-GB" dirty="0"/>
+              <a:t> la </a:t>
+            </a:r>
+            <a:r>
+              <a:rPr lang="en-GB" dirty="0" err="1"/>
+              <a:t>baza</a:t>
+            </a:r>
+            <a:r>
+              <a:rPr lang="en-GB" dirty="0"/>
+              <a:t> de date, </a:t>
+            </a:r>
+            <a:r>
+              <a:rPr lang="en-GB" dirty="0" err="1"/>
+              <a:t>iar</a:t>
+            </a:r>
+            <a:r>
+              <a:rPr lang="en-GB" dirty="0"/>
+              <a:t> </a:t>
+            </a:r>
+            <a:r>
+              <a:rPr lang="en-GB" dirty="0" err="1"/>
+              <a:t>metodele</a:t>
+            </a:r>
+            <a:r>
+              <a:rPr lang="en-GB" dirty="0"/>
+              <a:t> de test le am </a:t>
+            </a:r>
+            <a:r>
+              <a:rPr lang="en-GB" dirty="0" err="1"/>
+              <a:t>declarat</a:t>
+            </a:r>
+            <a:r>
+              <a:rPr lang="en-GB" dirty="0"/>
+              <a:t> </a:t>
+            </a:r>
+            <a:r>
+              <a:rPr lang="en-GB" dirty="0" err="1"/>
+              <a:t>publice</a:t>
+            </a:r>
+            <a:r>
+              <a:rPr lang="en-GB" dirty="0"/>
+              <a:t> </a:t>
+            </a:r>
+            <a:r>
+              <a:rPr lang="en-GB" dirty="0" err="1"/>
+              <a:t>pentru</a:t>
+            </a:r>
+            <a:r>
+              <a:rPr lang="en-GB" dirty="0"/>
+              <a:t> a fi </a:t>
+            </a:r>
+            <a:r>
+              <a:rPr lang="en-GB" dirty="0" err="1"/>
+              <a:t>vizibile</a:t>
+            </a:r>
+            <a:r>
+              <a:rPr lang="en-GB" dirty="0"/>
+              <a:t> de </a:t>
+            </a:r>
+            <a:r>
+              <a:rPr lang="en-GB" dirty="0" err="1"/>
+              <a:t>către</a:t>
+            </a:r>
+            <a:r>
+              <a:rPr lang="en-GB" dirty="0"/>
+              <a:t> </a:t>
+            </a:r>
+            <a:r>
+              <a:rPr lang="en-GB" dirty="0" err="1"/>
+              <a:t>PHPUnit</a:t>
+            </a:r>
+            <a:r>
+              <a:rPr lang="en-GB" dirty="0"/>
+              <a:t>.</a:t>
+            </a:r>
+          </a:p>
+          <a:p>
+            <a:endParaRPr lang="en-GB" dirty="0"/>
+          </a:p>
+        </p:txBody>
+      </p:sp>
+    </p:spTree>
+    <p:extLst>
+      <p:ext uri="{BB962C8B-B14F-4D97-AF65-F5344CB8AC3E}">
+        <p14:creationId xmlns:p14="http://schemas.microsoft.com/office/powerpoint/2010/main" val="4291554291"/>
+      </p:ext>
+    </p:extLst>
+  </p:cSld>
+  <p:clrMapOvr>
+    <a:masterClrMapping/>
+  </p:clrMapOvr>
+</p:sld>
+</file>
+
+<file path=ppt/slides/slide12.xml><?xml version="1.0" encoding="utf-8"?>
+<p:sld xmlns:a="http://schemas.openxmlformats.org/drawingml/2006/main" xmlns:r="http://schemas.openxmlformats.org/officeDocument/2006/relationships" xmlns:p="http://schemas.openxmlformats.org/presentationml/2006/main">
+  <p:cSld>
+    <p:spTree>
+      <p:nvGrpSpPr>
+        <p:cNvPr id="1" name=""/>
+        <p:cNvGrpSpPr/>
+        <p:nvPr/>
+      </p:nvGrpSpPr>
+      <p:grpSpPr>
+        <a:xfrm>
+          <a:off x="0" y="0"/>
+          <a:ext cx="0" cy="0"/>
+          <a:chOff x="0" y="0"/>
+          <a:chExt cx="0" cy="0"/>
+        </a:xfrm>
+      </p:grpSpPr>
+      <p:sp>
+        <p:nvSpPr>
+          <p:cNvPr id="2" name="Title 1">
+            <a:extLst>
+              <a:ext uri="{FF2B5EF4-FFF2-40B4-BE49-F238E27FC236}">
+                <a16:creationId xmlns:a16="http://schemas.microsoft.com/office/drawing/2014/main" id="{36961E3A-44DD-4745-A240-B28F174D0E6A}"/>
+              </a:ext>
+            </a:extLst>
+          </p:cNvPr>
+          <p:cNvSpPr>
+            <a:spLocks noGrp="1"/>
+          </p:cNvSpPr>
+          <p:nvPr>
+            <p:ph type="title"/>
+          </p:nvPr>
+        </p:nvSpPr>
+        <p:spPr/>
+        <p:txBody>
+          <a:bodyPr/>
+          <a:lstStyle/>
+          <a:p>
+            <a:r>
+              <a:rPr lang="en-US" dirty="0" err="1"/>
+              <a:t>Experimente</a:t>
+            </a:r>
+            <a:endParaRPr lang="en-GB" dirty="0"/>
+          </a:p>
+        </p:txBody>
+      </p:sp>
+      <p:sp>
+        <p:nvSpPr>
+          <p:cNvPr id="3" name="Content Placeholder 2">
+            <a:extLst>
+              <a:ext uri="{FF2B5EF4-FFF2-40B4-BE49-F238E27FC236}">
+                <a16:creationId xmlns:a16="http://schemas.microsoft.com/office/drawing/2014/main" id="{046D36EE-2632-444B-B2CC-4D6106528DE1}"/>
+              </a:ext>
+            </a:extLst>
+          </p:cNvPr>
+          <p:cNvSpPr>
+            <a:spLocks noGrp="1"/>
+          </p:cNvSpPr>
+          <p:nvPr>
+            <p:ph idx="1"/>
+          </p:nvPr>
+        </p:nvSpPr>
+        <p:spPr/>
+        <p:txBody>
+          <a:bodyPr>
+            <a:normAutofit fontScale="92500" lnSpcReduction="20000"/>
+          </a:bodyPr>
+          <a:lstStyle/>
+          <a:p>
+            <a:r>
+              <a:rPr lang="en-US" dirty="0"/>
+              <a:t>Delete</a:t>
+            </a:r>
+          </a:p>
+          <a:p>
+            <a:r>
+              <a:rPr lang="en-GB" dirty="0" err="1"/>
+              <a:t>Pentru</a:t>
+            </a:r>
+            <a:r>
+              <a:rPr lang="en-GB" dirty="0"/>
+              <a:t> </a:t>
+            </a:r>
+            <a:r>
+              <a:rPr lang="en-GB" dirty="0" err="1"/>
+              <a:t>Testul</a:t>
+            </a:r>
+            <a:r>
+              <a:rPr lang="en-GB" dirty="0"/>
+              <a:t> de Delete, am </a:t>
+            </a:r>
+            <a:r>
+              <a:rPr lang="en-GB" dirty="0" err="1"/>
+              <a:t>considerat</a:t>
+            </a:r>
+            <a:r>
+              <a:rPr lang="en-GB" dirty="0"/>
+              <a:t> 2 </a:t>
+            </a:r>
+            <a:r>
+              <a:rPr lang="en-GB" dirty="0" err="1"/>
+              <a:t>scenarii</a:t>
+            </a:r>
+            <a:r>
+              <a:rPr lang="en-GB" dirty="0"/>
+              <a:t>, </a:t>
+            </a:r>
+            <a:r>
+              <a:rPr lang="en-GB" dirty="0" err="1"/>
+              <a:t>cel</a:t>
+            </a:r>
+            <a:r>
+              <a:rPr lang="en-GB" dirty="0"/>
+              <a:t> </a:t>
+            </a:r>
+            <a:r>
+              <a:rPr lang="en-GB" dirty="0" err="1"/>
+              <a:t>în</a:t>
+            </a:r>
+            <a:r>
+              <a:rPr lang="en-GB" dirty="0"/>
+              <a:t> care </a:t>
+            </a:r>
+            <a:r>
+              <a:rPr lang="en-GB" dirty="0" err="1"/>
+              <a:t>vrem</a:t>
+            </a:r>
+            <a:r>
+              <a:rPr lang="en-GB" dirty="0"/>
+              <a:t> </a:t>
+            </a:r>
+            <a:r>
+              <a:rPr lang="en-GB" dirty="0" err="1"/>
+              <a:t>să</a:t>
+            </a:r>
+            <a:r>
+              <a:rPr lang="en-GB" dirty="0"/>
+              <a:t> </a:t>
+            </a:r>
+            <a:r>
+              <a:rPr lang="en-GB" dirty="0" err="1"/>
+              <a:t>verificăm</a:t>
+            </a:r>
+            <a:r>
+              <a:rPr lang="en-GB" dirty="0"/>
+              <a:t> </a:t>
+            </a:r>
+            <a:r>
+              <a:rPr lang="en-GB" dirty="0" err="1"/>
+              <a:t>dacă</a:t>
+            </a:r>
+            <a:r>
+              <a:rPr lang="en-GB" dirty="0"/>
+              <a:t> s-a </a:t>
+            </a:r>
+            <a:r>
+              <a:rPr lang="en-GB" dirty="0" err="1"/>
+              <a:t>șters</a:t>
+            </a:r>
+            <a:r>
+              <a:rPr lang="en-GB" dirty="0"/>
+              <a:t> o </a:t>
+            </a:r>
+            <a:r>
+              <a:rPr lang="en-GB" dirty="0" err="1"/>
+              <a:t>notă</a:t>
+            </a:r>
+            <a:r>
+              <a:rPr lang="en-GB" dirty="0"/>
+              <a:t>, </a:t>
+            </a:r>
+            <a:r>
+              <a:rPr lang="en-GB" dirty="0" err="1"/>
+              <a:t>și</a:t>
+            </a:r>
+            <a:r>
+              <a:rPr lang="en-GB" dirty="0"/>
+              <a:t> </a:t>
+            </a:r>
+            <a:r>
+              <a:rPr lang="en-GB" dirty="0" err="1"/>
+              <a:t>cel</a:t>
+            </a:r>
+            <a:r>
+              <a:rPr lang="en-GB" dirty="0"/>
+              <a:t> </a:t>
+            </a:r>
+            <a:r>
+              <a:rPr lang="en-GB" dirty="0" err="1"/>
+              <a:t>în</a:t>
+            </a:r>
+            <a:r>
+              <a:rPr lang="en-GB" dirty="0"/>
+              <a:t> care </a:t>
+            </a:r>
+            <a:r>
+              <a:rPr lang="en-GB" dirty="0" err="1"/>
+              <a:t>verificăm</a:t>
+            </a:r>
+            <a:r>
+              <a:rPr lang="en-GB" dirty="0"/>
+              <a:t> </a:t>
+            </a:r>
+            <a:r>
+              <a:rPr lang="en-GB" dirty="0" err="1"/>
+              <a:t>dacă</a:t>
+            </a:r>
+            <a:r>
+              <a:rPr lang="en-GB" dirty="0"/>
+              <a:t> nu </a:t>
+            </a:r>
+            <a:r>
+              <a:rPr lang="en-GB" dirty="0" err="1"/>
+              <a:t>cumva</a:t>
+            </a:r>
+            <a:r>
+              <a:rPr lang="en-GB" dirty="0"/>
+              <a:t> </a:t>
+            </a:r>
+            <a:r>
+              <a:rPr lang="en-GB" dirty="0" err="1"/>
+              <a:t>vrem</a:t>
+            </a:r>
+            <a:r>
+              <a:rPr lang="en-GB" dirty="0"/>
+              <a:t> </a:t>
+            </a:r>
+            <a:r>
+              <a:rPr lang="en-GB" dirty="0" err="1"/>
+              <a:t>să</a:t>
+            </a:r>
+            <a:r>
+              <a:rPr lang="en-GB" dirty="0"/>
+              <a:t> </a:t>
+            </a:r>
+            <a:r>
+              <a:rPr lang="en-GB" dirty="0" err="1"/>
+              <a:t>ștergem</a:t>
+            </a:r>
+            <a:r>
+              <a:rPr lang="en-GB" dirty="0"/>
+              <a:t> un ID inexistent. Le-am </a:t>
+            </a:r>
+            <a:r>
+              <a:rPr lang="en-GB" dirty="0" err="1"/>
+              <a:t>denumit</a:t>
+            </a:r>
+            <a:r>
+              <a:rPr lang="en-GB" dirty="0"/>
+              <a:t> </a:t>
+            </a:r>
+            <a:r>
+              <a:rPr lang="en-GB" dirty="0" err="1"/>
+              <a:t>testDeleteNote</a:t>
+            </a:r>
+            <a:r>
+              <a:rPr lang="en-GB" dirty="0"/>
+              <a:t>(), </a:t>
+            </a:r>
+            <a:r>
+              <a:rPr lang="en-GB" dirty="0" err="1"/>
+              <a:t>testDeleteNonExistingNote</a:t>
+            </a:r>
+            <a:r>
+              <a:rPr lang="en-GB" dirty="0"/>
+              <a:t>(). De </a:t>
+            </a:r>
+            <a:r>
+              <a:rPr lang="en-GB" dirty="0" err="1"/>
+              <a:t>obicei</a:t>
+            </a:r>
+            <a:r>
+              <a:rPr lang="en-GB" dirty="0"/>
+              <a:t> se </a:t>
+            </a:r>
+            <a:r>
+              <a:rPr lang="en-GB" dirty="0" err="1"/>
+              <a:t>folosesc</a:t>
+            </a:r>
+            <a:r>
+              <a:rPr lang="en-GB" dirty="0"/>
+              <a:t> </a:t>
+            </a:r>
+            <a:r>
+              <a:rPr lang="en-GB" dirty="0" err="1"/>
+              <a:t>instanțe</a:t>
+            </a:r>
+            <a:r>
+              <a:rPr lang="en-GB" dirty="0"/>
+              <a:t> </a:t>
+            </a:r>
+            <a:r>
+              <a:rPr lang="en-GB" dirty="0" err="1"/>
+              <a:t>mockup</a:t>
+            </a:r>
+            <a:r>
+              <a:rPr lang="en-GB" dirty="0"/>
+              <a:t>, </a:t>
+            </a:r>
+            <a:r>
+              <a:rPr lang="en-GB" dirty="0" err="1"/>
+              <a:t>metode</a:t>
+            </a:r>
+            <a:r>
+              <a:rPr lang="en-GB" dirty="0"/>
+              <a:t> </a:t>
+            </a:r>
+            <a:r>
+              <a:rPr lang="en-GB" dirty="0" err="1"/>
+              <a:t>sau</a:t>
+            </a:r>
+            <a:r>
+              <a:rPr lang="en-GB" dirty="0"/>
+              <a:t> </a:t>
+            </a:r>
+            <a:r>
+              <a:rPr lang="en-GB" dirty="0" err="1"/>
+              <a:t>clase</a:t>
+            </a:r>
+            <a:r>
+              <a:rPr lang="en-GB" dirty="0"/>
+              <a:t> </a:t>
+            </a:r>
+            <a:r>
+              <a:rPr lang="en-GB" dirty="0" err="1"/>
+              <a:t>după</a:t>
+            </a:r>
+            <a:r>
+              <a:rPr lang="en-GB" dirty="0"/>
+              <a:t> </a:t>
+            </a:r>
+            <a:r>
+              <a:rPr lang="en-GB" dirty="0" err="1"/>
+              <a:t>caz</a:t>
+            </a:r>
+            <a:r>
+              <a:rPr lang="en-GB" dirty="0"/>
+              <a:t> care au o </a:t>
+            </a:r>
+            <a:r>
+              <a:rPr lang="en-GB" dirty="0" err="1"/>
+              <a:t>structură</a:t>
+            </a:r>
+            <a:r>
+              <a:rPr lang="en-GB" dirty="0"/>
+              <a:t> </a:t>
+            </a:r>
+            <a:r>
+              <a:rPr lang="en-GB" dirty="0" err="1"/>
+              <a:t>mai</a:t>
+            </a:r>
+            <a:r>
+              <a:rPr lang="en-GB" dirty="0"/>
+              <a:t> </a:t>
+            </a:r>
+            <a:r>
+              <a:rPr lang="en-GB" dirty="0" err="1"/>
+              <a:t>simplificată</a:t>
+            </a:r>
+            <a:r>
+              <a:rPr lang="en-GB" dirty="0"/>
+              <a:t> a </a:t>
+            </a:r>
+            <a:r>
+              <a:rPr lang="en-GB" dirty="0" err="1"/>
+              <a:t>featureului</a:t>
+            </a:r>
+            <a:r>
+              <a:rPr lang="en-GB" dirty="0"/>
+              <a:t>. </a:t>
+            </a:r>
+            <a:r>
+              <a:rPr lang="en-GB" dirty="0" err="1"/>
+              <a:t>În</a:t>
+            </a:r>
+            <a:r>
+              <a:rPr lang="en-GB" dirty="0"/>
+              <a:t> </a:t>
+            </a:r>
+            <a:r>
+              <a:rPr lang="en-GB" dirty="0" err="1"/>
+              <a:t>cazul</a:t>
+            </a:r>
+            <a:r>
+              <a:rPr lang="en-GB" dirty="0"/>
+              <a:t> </a:t>
+            </a:r>
+            <a:r>
+              <a:rPr lang="en-GB" dirty="0" err="1"/>
+              <a:t>nostru</a:t>
+            </a:r>
+            <a:r>
+              <a:rPr lang="en-GB" dirty="0"/>
+              <a:t> </a:t>
+            </a:r>
+            <a:r>
+              <a:rPr lang="en-GB" dirty="0" err="1"/>
+              <a:t>acest</a:t>
+            </a:r>
+            <a:r>
+              <a:rPr lang="en-GB" dirty="0"/>
+              <a:t> </a:t>
+            </a:r>
+            <a:r>
+              <a:rPr lang="en-GB" dirty="0" err="1"/>
+              <a:t>lucru</a:t>
+            </a:r>
+            <a:r>
+              <a:rPr lang="en-GB" dirty="0"/>
+              <a:t> se </a:t>
+            </a:r>
+            <a:r>
+              <a:rPr lang="en-GB" dirty="0" err="1"/>
+              <a:t>poate</a:t>
+            </a:r>
+            <a:r>
+              <a:rPr lang="en-GB" dirty="0"/>
+              <a:t> face </a:t>
+            </a:r>
+            <a:r>
+              <a:rPr lang="en-GB" dirty="0" err="1"/>
+              <a:t>și</a:t>
+            </a:r>
+            <a:r>
+              <a:rPr lang="en-GB" dirty="0"/>
+              <a:t> </a:t>
+            </a:r>
+            <a:r>
+              <a:rPr lang="en-GB" dirty="0" err="1"/>
+              <a:t>replicînd</a:t>
+            </a:r>
+            <a:r>
+              <a:rPr lang="en-GB" dirty="0"/>
+              <a:t> </a:t>
+            </a:r>
+            <a:r>
+              <a:rPr lang="en-GB" dirty="0" err="1"/>
+              <a:t>aceleași</a:t>
+            </a:r>
+            <a:r>
+              <a:rPr lang="en-GB" dirty="0"/>
+              <a:t> </a:t>
+            </a:r>
+            <a:r>
+              <a:rPr lang="en-GB" dirty="0" err="1"/>
+              <a:t>funcționalități</a:t>
+            </a:r>
+            <a:r>
+              <a:rPr lang="en-GB" dirty="0"/>
+              <a:t>, </a:t>
+            </a:r>
+            <a:r>
+              <a:rPr lang="en-GB" dirty="0" err="1"/>
+              <a:t>fiind</a:t>
+            </a:r>
+            <a:r>
+              <a:rPr lang="en-GB" dirty="0"/>
+              <a:t> </a:t>
+            </a:r>
+            <a:r>
+              <a:rPr lang="en-GB" dirty="0" err="1"/>
+              <a:t>puține</a:t>
+            </a:r>
+            <a:r>
+              <a:rPr lang="en-GB" dirty="0"/>
+              <a:t> </a:t>
+            </a:r>
+            <a:r>
+              <a:rPr lang="en-GB" dirty="0" err="1"/>
+              <a:t>linii</a:t>
+            </a:r>
+            <a:r>
+              <a:rPr lang="en-GB" dirty="0"/>
+              <a:t> de cod. </a:t>
+            </a:r>
+            <a:r>
+              <a:rPr lang="en-GB" dirty="0" err="1"/>
+              <a:t>Pentru</a:t>
+            </a:r>
+            <a:r>
+              <a:rPr lang="en-GB" dirty="0"/>
+              <a:t> </a:t>
+            </a:r>
+            <a:r>
+              <a:rPr lang="en-GB" dirty="0" err="1"/>
+              <a:t>testDeleteNode</a:t>
+            </a:r>
+            <a:r>
+              <a:rPr lang="en-GB" dirty="0"/>
+              <a:t> </a:t>
+            </a:r>
+            <a:r>
+              <a:rPr lang="en-GB" dirty="0" err="1"/>
+              <a:t>experimentul</a:t>
+            </a:r>
+            <a:r>
+              <a:rPr lang="en-GB" dirty="0"/>
+              <a:t> a </a:t>
+            </a:r>
+            <a:r>
+              <a:rPr lang="en-GB" dirty="0" err="1"/>
+              <a:t>constat</a:t>
+            </a:r>
+            <a:r>
+              <a:rPr lang="en-GB" dirty="0"/>
+              <a:t> </a:t>
+            </a:r>
+            <a:r>
+              <a:rPr lang="en-GB" dirty="0" err="1"/>
+              <a:t>în</a:t>
+            </a:r>
+            <a:r>
+              <a:rPr lang="en-GB" dirty="0"/>
+              <a:t> a </a:t>
+            </a:r>
+            <a:r>
+              <a:rPr lang="en-GB" dirty="0" err="1"/>
+              <a:t>insera</a:t>
+            </a:r>
+            <a:r>
+              <a:rPr lang="en-GB" dirty="0"/>
+              <a:t> o </a:t>
+            </a:r>
+            <a:r>
+              <a:rPr lang="en-GB" dirty="0" err="1"/>
+              <a:t>valoare</a:t>
+            </a:r>
+            <a:r>
+              <a:rPr lang="en-GB" dirty="0"/>
+              <a:t> de test, </a:t>
+            </a:r>
+            <a:r>
+              <a:rPr lang="en-GB" dirty="0" err="1"/>
+              <a:t>iar</a:t>
+            </a:r>
+            <a:r>
+              <a:rPr lang="en-GB" dirty="0"/>
+              <a:t> ulterior de a </a:t>
+            </a:r>
+            <a:r>
+              <a:rPr lang="en-GB" dirty="0" err="1"/>
+              <a:t>aplica</a:t>
+            </a:r>
+            <a:r>
+              <a:rPr lang="en-GB" dirty="0"/>
+              <a:t> </a:t>
+            </a:r>
+            <a:r>
+              <a:rPr lang="en-GB" dirty="0" err="1"/>
+              <a:t>queryul</a:t>
+            </a:r>
+            <a:r>
+              <a:rPr lang="en-GB" dirty="0"/>
+              <a:t> de </a:t>
+            </a:r>
+            <a:r>
+              <a:rPr lang="en-GB" dirty="0" err="1"/>
+              <a:t>ștergere</a:t>
+            </a:r>
+            <a:r>
+              <a:rPr lang="en-GB" dirty="0"/>
+              <a:t> din </a:t>
+            </a:r>
+            <a:r>
+              <a:rPr lang="en-GB" dirty="0" err="1"/>
+              <a:t>baza</a:t>
+            </a:r>
+            <a:r>
+              <a:rPr lang="en-GB" dirty="0"/>
+              <a:t> de date </a:t>
+            </a:r>
+            <a:r>
+              <a:rPr lang="en-GB" dirty="0" err="1"/>
+              <a:t>pentru</a:t>
+            </a:r>
+            <a:r>
+              <a:rPr lang="en-GB" dirty="0"/>
+              <a:t> </a:t>
+            </a:r>
+            <a:r>
+              <a:rPr lang="en-GB" dirty="0" err="1"/>
+              <a:t>acel</a:t>
+            </a:r>
+            <a:r>
+              <a:rPr lang="en-GB" dirty="0"/>
+              <a:t> id. </a:t>
+            </a:r>
+            <a:r>
+              <a:rPr lang="en-GB" dirty="0" err="1"/>
+              <a:t>Metoda</a:t>
+            </a:r>
+            <a:r>
+              <a:rPr lang="en-GB" dirty="0"/>
+              <a:t> </a:t>
+            </a:r>
+            <a:r>
+              <a:rPr lang="en-GB" dirty="0" err="1"/>
+              <a:t>assertTrue</a:t>
+            </a:r>
+            <a:r>
+              <a:rPr lang="en-GB" dirty="0"/>
+              <a:t> </a:t>
+            </a:r>
+            <a:r>
+              <a:rPr lang="en-GB" dirty="0" err="1"/>
+              <a:t>moștenită</a:t>
+            </a:r>
+            <a:r>
+              <a:rPr lang="en-GB" dirty="0"/>
+              <a:t> din </a:t>
+            </a:r>
+          </a:p>
+          <a:p>
+            <a:r>
+              <a:rPr lang="en-GB" dirty="0" err="1"/>
+              <a:t>clasa</a:t>
+            </a:r>
+            <a:r>
+              <a:rPr lang="en-GB" dirty="0"/>
+              <a:t> </a:t>
+            </a:r>
+            <a:r>
+              <a:rPr lang="en-GB" dirty="0" err="1"/>
+              <a:t>TestCase</a:t>
+            </a:r>
+            <a:r>
+              <a:rPr lang="en-GB" dirty="0"/>
+              <a:t>, </a:t>
+            </a:r>
+            <a:r>
+              <a:rPr lang="en-GB" dirty="0" err="1"/>
+              <a:t>verifică</a:t>
+            </a:r>
+            <a:r>
+              <a:rPr lang="en-GB" dirty="0"/>
+              <a:t> </a:t>
+            </a:r>
+            <a:r>
+              <a:rPr lang="en-GB" dirty="0" err="1"/>
+              <a:t>dacă</a:t>
+            </a:r>
+            <a:r>
+              <a:rPr lang="en-GB" dirty="0"/>
+              <a:t> </a:t>
+            </a:r>
+            <a:r>
+              <a:rPr lang="en-GB" dirty="0" err="1"/>
+              <a:t>rezultatul</a:t>
+            </a:r>
+            <a:r>
+              <a:rPr lang="en-GB" dirty="0"/>
+              <a:t> </a:t>
+            </a:r>
+            <a:r>
+              <a:rPr lang="en-GB" dirty="0" err="1"/>
+              <a:t>metodei</a:t>
+            </a:r>
+            <a:r>
+              <a:rPr lang="en-GB" dirty="0"/>
+              <a:t> </a:t>
+            </a:r>
+            <a:r>
+              <a:rPr lang="en-GB" dirty="0" err="1"/>
+              <a:t>mysqli_query</a:t>
+            </a:r>
+            <a:r>
+              <a:rPr lang="en-GB" dirty="0"/>
+              <a:t> </a:t>
+            </a:r>
+            <a:r>
+              <a:rPr lang="en-GB" dirty="0" err="1"/>
+              <a:t>este</a:t>
+            </a:r>
+            <a:r>
+              <a:rPr lang="en-GB" dirty="0"/>
+              <a:t> </a:t>
+            </a:r>
+            <a:r>
+              <a:rPr lang="en-GB" dirty="0" err="1"/>
+              <a:t>nenul</a:t>
+            </a:r>
+            <a:r>
+              <a:rPr lang="en-GB" dirty="0"/>
+              <a:t>, </a:t>
+            </a:r>
+            <a:r>
+              <a:rPr lang="en-GB" dirty="0" err="1"/>
+              <a:t>adică</a:t>
+            </a:r>
+            <a:r>
+              <a:rPr lang="en-GB" dirty="0"/>
+              <a:t> </a:t>
+            </a:r>
+            <a:r>
+              <a:rPr lang="en-GB" dirty="0" err="1"/>
+              <a:t>dacă</a:t>
+            </a:r>
+            <a:r>
+              <a:rPr lang="en-GB" dirty="0"/>
+              <a:t> s-a </a:t>
+            </a:r>
+            <a:r>
+              <a:rPr lang="en-GB" dirty="0" err="1"/>
+              <a:t>produs</a:t>
+            </a:r>
+            <a:r>
+              <a:rPr lang="en-GB" dirty="0"/>
+              <a:t> cu </a:t>
+            </a:r>
+            <a:r>
+              <a:rPr lang="en-GB" dirty="0" err="1"/>
+              <a:t>succes</a:t>
+            </a:r>
+            <a:r>
+              <a:rPr lang="en-GB" dirty="0"/>
+              <a:t> </a:t>
+            </a:r>
+            <a:r>
+              <a:rPr lang="en-GB" dirty="0" err="1"/>
+              <a:t>queryul</a:t>
+            </a:r>
+            <a:r>
+              <a:rPr lang="en-GB" dirty="0"/>
+              <a:t>. </a:t>
+            </a:r>
+            <a:r>
+              <a:rPr lang="en-GB" dirty="0" err="1"/>
+              <a:t>Următorul</a:t>
+            </a:r>
+            <a:r>
+              <a:rPr lang="en-GB" dirty="0"/>
+              <a:t> experiment </a:t>
+            </a:r>
+            <a:r>
+              <a:rPr lang="en-GB" dirty="0" err="1"/>
+              <a:t>constă</a:t>
+            </a:r>
+            <a:r>
+              <a:rPr lang="en-GB" dirty="0"/>
+              <a:t> din a face un query</a:t>
+            </a:r>
+          </a:p>
+          <a:p>
+            <a:r>
+              <a:rPr lang="en-GB" dirty="0" err="1"/>
+              <a:t>pentru</a:t>
+            </a:r>
+            <a:r>
+              <a:rPr lang="en-GB" dirty="0"/>
+              <a:t> a </a:t>
+            </a:r>
+            <a:r>
+              <a:rPr lang="en-GB" dirty="0" err="1"/>
+              <a:t>verifica</a:t>
+            </a:r>
+            <a:r>
+              <a:rPr lang="en-GB" dirty="0"/>
+              <a:t> </a:t>
+            </a:r>
+            <a:r>
+              <a:rPr lang="en-GB" dirty="0" err="1"/>
+              <a:t>dacă</a:t>
+            </a:r>
+            <a:r>
+              <a:rPr lang="en-GB" dirty="0"/>
+              <a:t> </a:t>
+            </a:r>
+            <a:r>
+              <a:rPr lang="en-GB" dirty="0" err="1"/>
+              <a:t>cumva</a:t>
+            </a:r>
+            <a:r>
+              <a:rPr lang="en-GB" dirty="0"/>
+              <a:t> </a:t>
+            </a:r>
+            <a:r>
+              <a:rPr lang="en-GB" dirty="0" err="1"/>
+              <a:t>notita</a:t>
+            </a:r>
+            <a:r>
+              <a:rPr lang="en-GB" dirty="0"/>
+              <a:t> </a:t>
+            </a:r>
+            <a:r>
+              <a:rPr lang="en-GB" dirty="0" err="1"/>
+              <a:t>stearsa</a:t>
+            </a:r>
+            <a:r>
+              <a:rPr lang="en-GB" dirty="0"/>
+              <a:t> a </a:t>
+            </a:r>
+            <a:r>
+              <a:rPr lang="en-GB" dirty="0" err="1"/>
+              <a:t>ramas</a:t>
+            </a:r>
+            <a:r>
+              <a:rPr lang="en-GB" dirty="0"/>
+              <a:t> </a:t>
+            </a:r>
+            <a:r>
+              <a:rPr lang="en-GB" dirty="0" err="1"/>
+              <a:t>în</a:t>
+            </a:r>
+            <a:r>
+              <a:rPr lang="en-GB" dirty="0"/>
+              <a:t> </a:t>
+            </a:r>
+            <a:r>
+              <a:rPr lang="en-GB" dirty="0" err="1"/>
+              <a:t>baza</a:t>
+            </a:r>
+            <a:r>
+              <a:rPr lang="en-GB" dirty="0"/>
+              <a:t> de date. </a:t>
+            </a:r>
+            <a:r>
+              <a:rPr lang="en-GB" dirty="0" err="1"/>
+              <a:t>Metoda</a:t>
+            </a:r>
+            <a:r>
+              <a:rPr lang="en-GB" dirty="0"/>
+              <a:t> </a:t>
+            </a:r>
+            <a:r>
+              <a:rPr lang="en-GB" dirty="0" err="1"/>
+              <a:t>assertEquals</a:t>
+            </a:r>
+            <a:r>
+              <a:rPr lang="en-GB" dirty="0"/>
+              <a:t> </a:t>
+            </a:r>
+            <a:r>
+              <a:rPr lang="en-GB" dirty="0" err="1"/>
+              <a:t>moștenită</a:t>
+            </a:r>
+            <a:r>
+              <a:rPr lang="en-GB" dirty="0"/>
+              <a:t> din </a:t>
+            </a:r>
+            <a:r>
+              <a:rPr lang="en-GB" dirty="0" err="1"/>
+              <a:t>clasa</a:t>
+            </a:r>
+            <a:r>
+              <a:rPr lang="en-GB" dirty="0"/>
+              <a:t> </a:t>
+            </a:r>
+            <a:r>
+              <a:rPr lang="en-GB" dirty="0" err="1"/>
+              <a:t>TestCase</a:t>
+            </a:r>
+            <a:r>
+              <a:rPr lang="en-GB" dirty="0"/>
+              <a:t>, </a:t>
+            </a:r>
+            <a:r>
+              <a:rPr lang="en-GB" dirty="0" err="1"/>
+              <a:t>Verifică</a:t>
+            </a:r>
+            <a:r>
+              <a:rPr lang="en-GB" dirty="0"/>
+              <a:t> </a:t>
+            </a:r>
+            <a:r>
+              <a:rPr lang="en-GB" dirty="0" err="1"/>
+              <a:t>dacă</a:t>
+            </a:r>
+            <a:r>
+              <a:rPr lang="en-GB" dirty="0"/>
+              <a:t> </a:t>
+            </a:r>
+            <a:r>
+              <a:rPr lang="en-GB" dirty="0" err="1"/>
+              <a:t>numărul</a:t>
+            </a:r>
+            <a:r>
+              <a:rPr lang="en-GB" dirty="0"/>
+              <a:t> de </a:t>
+            </a:r>
+            <a:r>
+              <a:rPr lang="en-GB" dirty="0" err="1"/>
+              <a:t>înregistrări</a:t>
+            </a:r>
+            <a:r>
+              <a:rPr lang="en-GB" dirty="0"/>
+              <a:t> </a:t>
+            </a:r>
+            <a:r>
+              <a:rPr lang="en-GB" dirty="0" err="1"/>
+              <a:t>pentru</a:t>
+            </a:r>
+            <a:r>
+              <a:rPr lang="en-GB" dirty="0"/>
+              <a:t> </a:t>
+            </a:r>
+            <a:r>
+              <a:rPr lang="en-GB" dirty="0" err="1"/>
+              <a:t>idul</a:t>
+            </a:r>
+            <a:endParaRPr lang="en-GB" dirty="0"/>
+          </a:p>
+          <a:p>
+            <a:r>
+              <a:rPr lang="en-GB" dirty="0" err="1"/>
+              <a:t>șters</a:t>
+            </a:r>
+            <a:r>
+              <a:rPr lang="en-GB" dirty="0"/>
+              <a:t> </a:t>
+            </a:r>
+            <a:r>
+              <a:rPr lang="en-GB" dirty="0" err="1"/>
+              <a:t>este</a:t>
+            </a:r>
+            <a:r>
+              <a:rPr lang="en-GB" dirty="0"/>
+              <a:t> </a:t>
+            </a:r>
+            <a:r>
+              <a:rPr lang="en-GB" dirty="0" err="1"/>
+              <a:t>egal</a:t>
+            </a:r>
+            <a:r>
+              <a:rPr lang="en-GB" dirty="0"/>
+              <a:t> cu 0. </a:t>
+            </a:r>
+            <a:r>
+              <a:rPr lang="en-GB" dirty="0" err="1"/>
+              <a:t>Pentru</a:t>
+            </a:r>
+            <a:r>
+              <a:rPr lang="en-GB" dirty="0"/>
+              <a:t> </a:t>
+            </a:r>
+            <a:r>
+              <a:rPr lang="en-GB" dirty="0" err="1"/>
+              <a:t>testul</a:t>
+            </a:r>
+            <a:r>
+              <a:rPr lang="en-GB" dirty="0"/>
+              <a:t> </a:t>
+            </a:r>
+            <a:r>
+              <a:rPr lang="en-GB" dirty="0" err="1"/>
+              <a:t>în</a:t>
+            </a:r>
+            <a:r>
+              <a:rPr lang="en-GB" dirty="0"/>
+              <a:t> care </a:t>
+            </a:r>
+            <a:r>
+              <a:rPr lang="en-GB" dirty="0" err="1"/>
+              <a:t>vedem</a:t>
+            </a:r>
+            <a:r>
+              <a:rPr lang="en-GB" dirty="0"/>
+              <a:t> </a:t>
+            </a:r>
+            <a:r>
+              <a:rPr lang="en-GB" dirty="0" err="1"/>
+              <a:t>dacă</a:t>
+            </a:r>
+            <a:r>
+              <a:rPr lang="en-GB" dirty="0"/>
+              <a:t> se </a:t>
+            </a:r>
+            <a:r>
+              <a:rPr lang="en-GB" dirty="0" err="1"/>
+              <a:t>șterge</a:t>
+            </a:r>
+            <a:r>
+              <a:rPr lang="en-GB" dirty="0"/>
+              <a:t> un id inexistent, </a:t>
+            </a:r>
+            <a:r>
+              <a:rPr lang="en-GB" dirty="0" err="1"/>
+              <a:t>încercăm</a:t>
+            </a:r>
+            <a:r>
+              <a:rPr lang="en-GB" dirty="0"/>
+              <a:t> </a:t>
+            </a:r>
+            <a:r>
+              <a:rPr lang="en-GB" dirty="0" err="1"/>
+              <a:t>să</a:t>
+            </a:r>
+            <a:r>
+              <a:rPr lang="en-GB" dirty="0"/>
+              <a:t> </a:t>
+            </a:r>
+            <a:r>
+              <a:rPr lang="en-GB" dirty="0" err="1"/>
+              <a:t>ștergem</a:t>
+            </a:r>
+            <a:r>
+              <a:rPr lang="en-GB" dirty="0"/>
+              <a:t> un id </a:t>
+            </a:r>
+            <a:r>
+              <a:rPr lang="en-GB" dirty="0" err="1"/>
+              <a:t>arbitrar</a:t>
+            </a:r>
+            <a:r>
+              <a:rPr lang="en-GB" dirty="0"/>
+              <a:t> care nu </a:t>
+            </a:r>
+            <a:r>
+              <a:rPr lang="en-GB" dirty="0" err="1"/>
+              <a:t>exista</a:t>
+            </a:r>
+            <a:r>
+              <a:rPr lang="en-GB" dirty="0"/>
+              <a:t> in BD, </a:t>
+            </a:r>
+            <a:r>
+              <a:rPr lang="en-GB" dirty="0" err="1"/>
+              <a:t>și</a:t>
+            </a:r>
+            <a:r>
+              <a:rPr lang="en-GB" dirty="0"/>
+              <a:t> </a:t>
+            </a:r>
+            <a:r>
+              <a:rPr lang="en-GB" dirty="0" err="1"/>
+              <a:t>verificăm</a:t>
+            </a:r>
+            <a:r>
+              <a:rPr lang="en-GB" dirty="0"/>
+              <a:t> </a:t>
+            </a:r>
+            <a:r>
+              <a:rPr lang="en-GB" dirty="0" err="1"/>
+              <a:t>dacă</a:t>
+            </a:r>
+            <a:r>
+              <a:rPr lang="en-GB" dirty="0"/>
+              <a:t> </a:t>
+            </a:r>
+            <a:r>
+              <a:rPr lang="en-GB" dirty="0" err="1"/>
+              <a:t>queryul</a:t>
+            </a:r>
+            <a:r>
+              <a:rPr lang="en-GB" dirty="0"/>
+              <a:t> s-a </a:t>
+            </a:r>
+            <a:r>
+              <a:rPr lang="en-GB" dirty="0" err="1"/>
+              <a:t>executat</a:t>
+            </a:r>
+            <a:r>
+              <a:rPr lang="en-GB" dirty="0"/>
+              <a:t> cu </a:t>
+            </a:r>
+            <a:r>
+              <a:rPr lang="en-GB" dirty="0" err="1"/>
+              <a:t>succes</a:t>
+            </a:r>
+            <a:r>
+              <a:rPr lang="en-GB" dirty="0"/>
+              <a:t> </a:t>
+            </a:r>
+            <a:r>
+              <a:rPr lang="en-GB" dirty="0" err="1"/>
+              <a:t>sau</a:t>
+            </a:r>
+            <a:r>
+              <a:rPr lang="en-GB" dirty="0"/>
+              <a:t> nu.</a:t>
+            </a:r>
+          </a:p>
+          <a:p>
+            <a:endParaRPr lang="en-GB" dirty="0"/>
+          </a:p>
+        </p:txBody>
+      </p:sp>
+    </p:spTree>
+    <p:extLst>
+      <p:ext uri="{BB962C8B-B14F-4D97-AF65-F5344CB8AC3E}">
+        <p14:creationId xmlns:p14="http://schemas.microsoft.com/office/powerpoint/2010/main" val="4095263568"/>
+      </p:ext>
+    </p:extLst>
+  </p:cSld>
+  <p:clrMapOvr>
+    <a:masterClrMapping/>
+  </p:clrMapOvr>
+</p:sld>
+</file>
+
+<file path=ppt/slides/slide13.xml><?xml version="1.0" encoding="utf-8"?>
+<p:sld xmlns:a="http://schemas.openxmlformats.org/drawingml/2006/main" xmlns:r="http://schemas.openxmlformats.org/officeDocument/2006/relationships" xmlns:p="http://schemas.openxmlformats.org/presentationml/2006/main">
+  <p:cSld>
+    <p:spTree>
+      <p:nvGrpSpPr>
+        <p:cNvPr id="1" name=""/>
+        <p:cNvGrpSpPr/>
+        <p:nvPr/>
+      </p:nvGrpSpPr>
+      <p:grpSpPr>
+        <a:xfrm>
+          <a:off x="0" y="0"/>
+          <a:ext cx="0" cy="0"/>
+          <a:chOff x="0" y="0"/>
+          <a:chExt cx="0" cy="0"/>
+        </a:xfrm>
+      </p:grpSpPr>
+      <p:sp>
+        <p:nvSpPr>
+          <p:cNvPr id="2" name="Title 1">
+            <a:extLst>
+              <a:ext uri="{FF2B5EF4-FFF2-40B4-BE49-F238E27FC236}">
+                <a16:creationId xmlns:a16="http://schemas.microsoft.com/office/drawing/2014/main" id="{49E71597-E75B-4355-AEE7-442ACD88E10B}"/>
+              </a:ext>
+            </a:extLst>
+          </p:cNvPr>
+          <p:cNvSpPr>
+            <a:spLocks noGrp="1"/>
+          </p:cNvSpPr>
+          <p:nvPr>
+            <p:ph type="title"/>
+          </p:nvPr>
+        </p:nvSpPr>
+        <p:spPr/>
+        <p:txBody>
+          <a:bodyPr/>
+          <a:lstStyle/>
+          <a:p>
+            <a:r>
+              <a:rPr lang="en-US" dirty="0"/>
+              <a:t>Edit, fetch, create</a:t>
+            </a:r>
+            <a:endParaRPr lang="en-GB" dirty="0"/>
+          </a:p>
+        </p:txBody>
+      </p:sp>
+      <p:sp>
+        <p:nvSpPr>
+          <p:cNvPr id="3" name="Content Placeholder 2">
+            <a:extLst>
+              <a:ext uri="{FF2B5EF4-FFF2-40B4-BE49-F238E27FC236}">
+                <a16:creationId xmlns:a16="http://schemas.microsoft.com/office/drawing/2014/main" id="{E165954C-D64B-432A-AAB0-B8744EFCAA0D}"/>
+              </a:ext>
+            </a:extLst>
+          </p:cNvPr>
+          <p:cNvSpPr>
+            <a:spLocks noGrp="1"/>
+          </p:cNvSpPr>
+          <p:nvPr>
+            <p:ph idx="1"/>
+          </p:nvPr>
+        </p:nvSpPr>
+        <p:spPr/>
+        <p:txBody>
+          <a:bodyPr/>
+          <a:lstStyle/>
+          <a:p>
+            <a:r>
+              <a:rPr lang="en-GB" dirty="0" err="1"/>
+              <a:t>Pentru</a:t>
+            </a:r>
+            <a:r>
+              <a:rPr lang="en-GB" dirty="0"/>
+              <a:t> </a:t>
+            </a:r>
+            <a:r>
+              <a:rPr lang="en-GB" dirty="0" err="1"/>
+              <a:t>featureurile</a:t>
+            </a:r>
+            <a:r>
+              <a:rPr lang="en-GB" dirty="0"/>
+              <a:t> de edit, insert, fetch am </a:t>
+            </a:r>
+            <a:r>
+              <a:rPr lang="en-GB" dirty="0" err="1"/>
+              <a:t>aplicat</a:t>
+            </a:r>
+            <a:r>
+              <a:rPr lang="en-GB" dirty="0"/>
+              <a:t> o </a:t>
+            </a:r>
+            <a:r>
+              <a:rPr lang="en-GB" dirty="0" err="1"/>
+              <a:t>structură</a:t>
+            </a:r>
+            <a:r>
+              <a:rPr lang="en-GB" dirty="0"/>
+              <a:t> </a:t>
+            </a:r>
+            <a:r>
+              <a:rPr lang="en-GB" dirty="0" err="1"/>
+              <a:t>și</a:t>
+            </a:r>
+            <a:r>
+              <a:rPr lang="en-GB" dirty="0"/>
+              <a:t> un </a:t>
+            </a:r>
+            <a:r>
+              <a:rPr lang="en-GB" dirty="0" err="1"/>
+              <a:t>raționament</a:t>
+            </a:r>
+            <a:r>
+              <a:rPr lang="en-GB" dirty="0"/>
+              <a:t> similar, </a:t>
+            </a:r>
+            <a:r>
+              <a:rPr lang="en-GB" dirty="0" err="1"/>
+              <a:t>așa</a:t>
+            </a:r>
+            <a:r>
+              <a:rPr lang="en-GB" dirty="0"/>
+              <a:t> cum am </a:t>
+            </a:r>
+            <a:r>
+              <a:rPr lang="en-GB" dirty="0" err="1"/>
+              <a:t>menționat</a:t>
+            </a:r>
+            <a:r>
+              <a:rPr lang="en-GB" dirty="0"/>
+              <a:t> </a:t>
+            </a:r>
+            <a:r>
+              <a:rPr lang="en-GB" dirty="0" err="1"/>
+              <a:t>mai</a:t>
+            </a:r>
+            <a:r>
+              <a:rPr lang="en-GB" dirty="0"/>
+              <a:t> sus. </a:t>
+            </a:r>
+            <a:r>
+              <a:rPr lang="en-GB" dirty="0" err="1"/>
+              <a:t>Pentru</a:t>
+            </a:r>
+            <a:r>
+              <a:rPr lang="en-GB" dirty="0"/>
+              <a:t> </a:t>
+            </a:r>
+            <a:r>
+              <a:rPr lang="en-GB" dirty="0" err="1"/>
+              <a:t>restul</a:t>
+            </a:r>
+            <a:r>
+              <a:rPr lang="en-GB" dirty="0"/>
+              <a:t> nu am </a:t>
+            </a:r>
+            <a:r>
+              <a:rPr lang="en-GB" dirty="0" err="1"/>
+              <a:t>verificat</a:t>
+            </a:r>
+            <a:r>
+              <a:rPr lang="en-GB" dirty="0"/>
+              <a:t> ca </a:t>
+            </a:r>
+            <a:r>
+              <a:rPr lang="en-GB" dirty="0" err="1"/>
+              <a:t>și</a:t>
+            </a:r>
+            <a:r>
+              <a:rPr lang="en-GB" dirty="0"/>
+              <a:t> la delete, </a:t>
+            </a:r>
+            <a:r>
+              <a:rPr lang="en-GB" dirty="0" err="1"/>
+              <a:t>scenariu</a:t>
+            </a:r>
+            <a:r>
+              <a:rPr lang="en-GB" dirty="0"/>
+              <a:t> </a:t>
+            </a:r>
+            <a:r>
+              <a:rPr lang="en-GB" dirty="0" err="1"/>
+              <a:t>în</a:t>
+            </a:r>
+            <a:r>
+              <a:rPr lang="en-GB" dirty="0"/>
+              <a:t> care am </a:t>
+            </a:r>
+            <a:r>
+              <a:rPr lang="en-GB" dirty="0" err="1"/>
+              <a:t>putea</a:t>
+            </a:r>
+            <a:r>
+              <a:rPr lang="en-GB" dirty="0"/>
+              <a:t> </a:t>
+            </a:r>
+            <a:r>
+              <a:rPr lang="en-GB" dirty="0" err="1"/>
+              <a:t>accesa</a:t>
+            </a:r>
+            <a:r>
+              <a:rPr lang="en-GB" dirty="0"/>
+              <a:t> un id inexistent, </a:t>
+            </a:r>
+            <a:r>
+              <a:rPr lang="en-GB" dirty="0" err="1"/>
+              <a:t>deoarece</a:t>
+            </a:r>
+            <a:r>
+              <a:rPr lang="en-GB" dirty="0"/>
+              <a:t> </a:t>
+            </a:r>
+            <a:r>
+              <a:rPr lang="en-GB" dirty="0" err="1"/>
+              <a:t>celelalte</a:t>
+            </a:r>
+            <a:r>
+              <a:rPr lang="en-GB" dirty="0"/>
+              <a:t> </a:t>
+            </a:r>
+            <a:r>
+              <a:rPr lang="en-GB" dirty="0" err="1"/>
+              <a:t>operațiuni</a:t>
+            </a:r>
+            <a:r>
+              <a:rPr lang="en-GB" dirty="0"/>
+              <a:t> nu </a:t>
+            </a:r>
+            <a:r>
+              <a:rPr lang="en-GB" dirty="0" err="1"/>
+              <a:t>implică</a:t>
+            </a:r>
+            <a:r>
+              <a:rPr lang="en-GB" dirty="0"/>
+              <a:t> </a:t>
+            </a:r>
+            <a:r>
+              <a:rPr lang="en-GB" dirty="0" err="1"/>
+              <a:t>modificări</a:t>
+            </a:r>
+            <a:r>
+              <a:rPr lang="en-GB" dirty="0"/>
+              <a:t> </a:t>
+            </a:r>
+            <a:r>
+              <a:rPr lang="en-GB" dirty="0" err="1"/>
+              <a:t>asupra</a:t>
+            </a:r>
+            <a:r>
+              <a:rPr lang="en-GB" dirty="0"/>
+              <a:t> id-</a:t>
+            </a:r>
+            <a:r>
+              <a:rPr lang="en-GB" dirty="0" err="1"/>
+              <a:t>ului</a:t>
+            </a:r>
+            <a:r>
+              <a:rPr lang="en-GB" dirty="0"/>
+              <a:t>. Cu </a:t>
+            </a:r>
+            <a:r>
+              <a:rPr lang="en-GB" dirty="0" err="1"/>
+              <a:t>toate</a:t>
+            </a:r>
+            <a:r>
+              <a:rPr lang="en-GB" dirty="0"/>
+              <a:t> </a:t>
+            </a:r>
+            <a:r>
+              <a:rPr lang="en-GB" dirty="0" err="1"/>
+              <a:t>acestea</a:t>
+            </a:r>
+            <a:r>
+              <a:rPr lang="en-GB" dirty="0"/>
+              <a:t>, </a:t>
+            </a:r>
+            <a:r>
+              <a:rPr lang="en-GB" dirty="0" err="1"/>
+              <a:t>dacă</a:t>
+            </a:r>
+            <a:r>
+              <a:rPr lang="en-GB" dirty="0"/>
+              <a:t> am fi </a:t>
+            </a:r>
+            <a:r>
+              <a:rPr lang="en-GB" dirty="0" err="1"/>
+              <a:t>implementat</a:t>
+            </a:r>
+            <a:r>
+              <a:rPr lang="en-GB" dirty="0"/>
+              <a:t> feature de </a:t>
+            </a:r>
+            <a:r>
+              <a:rPr lang="en-GB" dirty="0" err="1"/>
+              <a:t>sortare</a:t>
+            </a:r>
+            <a:r>
+              <a:rPr lang="en-GB" dirty="0"/>
+              <a:t> </a:t>
+            </a:r>
+            <a:r>
+              <a:rPr lang="en-GB" dirty="0" err="1"/>
+              <a:t>și</a:t>
+            </a:r>
+            <a:r>
+              <a:rPr lang="en-GB" dirty="0"/>
+              <a:t> </a:t>
+            </a:r>
+            <a:r>
+              <a:rPr lang="en-GB" dirty="0" err="1"/>
+              <a:t>căutare</a:t>
+            </a:r>
+            <a:r>
+              <a:rPr lang="en-GB" dirty="0"/>
+              <a:t>, am fi </a:t>
+            </a:r>
+            <a:r>
+              <a:rPr lang="en-GB" dirty="0" err="1"/>
+              <a:t>aplicat</a:t>
+            </a:r>
+            <a:r>
+              <a:rPr lang="en-GB" dirty="0"/>
+              <a:t> </a:t>
+            </a:r>
+            <a:r>
+              <a:rPr lang="en-GB" dirty="0" err="1"/>
+              <a:t>pentru</a:t>
+            </a:r>
+            <a:r>
+              <a:rPr lang="en-GB" dirty="0"/>
+              <a:t> fetch </a:t>
+            </a:r>
+            <a:r>
+              <a:rPr lang="en-GB" dirty="0" err="1"/>
+              <a:t>după</a:t>
+            </a:r>
+            <a:r>
+              <a:rPr lang="en-GB" dirty="0"/>
+              <a:t> id un test similar.</a:t>
+            </a:r>
+          </a:p>
+          <a:p>
+            <a:endParaRPr lang="en-GB" dirty="0"/>
+          </a:p>
+        </p:txBody>
+      </p:sp>
+    </p:spTree>
+    <p:extLst>
+      <p:ext uri="{BB962C8B-B14F-4D97-AF65-F5344CB8AC3E}">
+        <p14:creationId xmlns:p14="http://schemas.microsoft.com/office/powerpoint/2010/main" val="3554062192"/>
+      </p:ext>
+    </p:extLst>
+  </p:cSld>
+  <p:clrMapOvr>
+    <a:masterClrMapping/>
+  </p:clrMapOvr>
+</p:sld>
+</file>
+
+<file path=ppt/slides/slide14.xml><?xml version="1.0" encoding="utf-8"?>
+<p:sld xmlns:a="http://schemas.openxmlformats.org/drawingml/2006/main" xmlns:r="http://schemas.openxmlformats.org/officeDocument/2006/relationships" xmlns:p="http://schemas.openxmlformats.org/presentationml/2006/main">
+  <p:cSld>
+    <p:spTree>
+      <p:nvGrpSpPr>
+        <p:cNvPr id="1" name=""/>
+        <p:cNvGrpSpPr/>
+        <p:nvPr/>
+      </p:nvGrpSpPr>
+      <p:grpSpPr>
+        <a:xfrm>
+          <a:off x="0" y="0"/>
+          <a:ext cx="0" cy="0"/>
+          <a:chOff x="0" y="0"/>
+          <a:chExt cx="0" cy="0"/>
+        </a:xfrm>
+      </p:grpSpPr>
+      <p:sp>
+        <p:nvSpPr>
+          <p:cNvPr id="2" name="Title 1">
+            <a:extLst>
+              <a:ext uri="{FF2B5EF4-FFF2-40B4-BE49-F238E27FC236}">
+                <a16:creationId xmlns:a16="http://schemas.microsoft.com/office/drawing/2014/main" id="{B73879B8-B6D4-4130-993C-BE4934353E88}"/>
+              </a:ext>
+            </a:extLst>
+          </p:cNvPr>
+          <p:cNvSpPr>
+            <a:spLocks noGrp="1"/>
+          </p:cNvSpPr>
+          <p:nvPr>
+            <p:ph type="title"/>
+          </p:nvPr>
+        </p:nvSpPr>
+        <p:spPr/>
+        <p:txBody>
+          <a:bodyPr/>
+          <a:lstStyle/>
+          <a:p>
+            <a:r>
+              <a:rPr lang="en-US" dirty="0" err="1"/>
+              <a:t>Executie</a:t>
+            </a:r>
+            <a:r>
+              <a:rPr lang="en-US" dirty="0"/>
+              <a:t> teste</a:t>
+            </a:r>
+            <a:endParaRPr lang="en-GB" dirty="0"/>
+          </a:p>
+        </p:txBody>
+      </p:sp>
+      <p:sp>
+        <p:nvSpPr>
+          <p:cNvPr id="3" name="Content Placeholder 2">
+            <a:extLst>
+              <a:ext uri="{FF2B5EF4-FFF2-40B4-BE49-F238E27FC236}">
+                <a16:creationId xmlns:a16="http://schemas.microsoft.com/office/drawing/2014/main" id="{018654BC-5E63-4DF6-9A9B-9A947DEC1341}"/>
+              </a:ext>
+            </a:extLst>
+          </p:cNvPr>
+          <p:cNvSpPr>
+            <a:spLocks noGrp="1"/>
+          </p:cNvSpPr>
+          <p:nvPr>
+            <p:ph idx="1"/>
+          </p:nvPr>
+        </p:nvSpPr>
+        <p:spPr/>
+        <p:txBody>
+          <a:bodyPr/>
+          <a:lstStyle/>
+          <a:p>
+            <a:r>
+              <a:rPr lang="en-GB" dirty="0" err="1"/>
+              <a:t>Testele</a:t>
+            </a:r>
+            <a:r>
+              <a:rPr lang="en-GB" dirty="0"/>
+              <a:t> se </a:t>
+            </a:r>
+            <a:r>
+              <a:rPr lang="en-GB" dirty="0" err="1"/>
+              <a:t>ruleaza</a:t>
+            </a:r>
+            <a:r>
+              <a:rPr lang="en-GB" dirty="0"/>
+              <a:t> </a:t>
+            </a:r>
+            <a:r>
+              <a:rPr lang="en-GB" dirty="0" err="1"/>
+              <a:t>ducîndu</a:t>
+            </a:r>
+            <a:r>
+              <a:rPr lang="en-GB" dirty="0"/>
+              <a:t> ne in </a:t>
+            </a:r>
+            <a:r>
+              <a:rPr lang="en-GB" dirty="0" err="1"/>
+              <a:t>directorul</a:t>
+            </a:r>
+            <a:r>
+              <a:rPr lang="en-GB" dirty="0"/>
+              <a:t> cu php unit </a:t>
+            </a:r>
+            <a:r>
+              <a:rPr lang="en-GB" dirty="0" err="1"/>
+              <a:t>și</a:t>
+            </a:r>
+            <a:r>
+              <a:rPr lang="en-GB" dirty="0"/>
+              <a:t> </a:t>
+            </a:r>
+            <a:r>
+              <a:rPr lang="en-GB" dirty="0" err="1"/>
+              <a:t>dand</a:t>
+            </a:r>
+            <a:r>
+              <a:rPr lang="en-GB" dirty="0"/>
+              <a:t> ca </a:t>
+            </a:r>
+            <a:r>
+              <a:rPr lang="en-GB" dirty="0" err="1"/>
+              <a:t>parametru</a:t>
+            </a:r>
+            <a:r>
+              <a:rPr lang="en-GB" dirty="0"/>
+              <a:t> </a:t>
+            </a:r>
+            <a:r>
+              <a:rPr lang="en-GB" dirty="0" err="1"/>
+              <a:t>folderul</a:t>
+            </a:r>
+            <a:r>
+              <a:rPr lang="en-GB" dirty="0"/>
+              <a:t> tests.</a:t>
+            </a:r>
+          </a:p>
+          <a:p>
+            <a:endParaRPr lang="en-GB" dirty="0"/>
+          </a:p>
+        </p:txBody>
+      </p:sp>
+    </p:spTree>
+    <p:extLst>
+      <p:ext uri="{BB962C8B-B14F-4D97-AF65-F5344CB8AC3E}">
+        <p14:creationId xmlns:p14="http://schemas.microsoft.com/office/powerpoint/2010/main" val="3977468145"/>
+      </p:ext>
+    </p:extLst>
+  </p:cSld>
+  <p:clrMapOvr>
+    <a:masterClrMapping/>
+  </p:clrMapOvr>
+</p:sld>
+</file>
+
+<file path=ppt/slides/slide15.xml><?xml version="1.0" encoding="utf-8"?>
+<p:sld xmlns:a="http://schemas.openxmlformats.org/drawingml/2006/main" xmlns:r="http://schemas.openxmlformats.org/officeDocument/2006/relationships" xmlns:p="http://schemas.openxmlformats.org/presentationml/2006/main">
+  <p:cSld>
+    <p:spTree>
+      <p:nvGrpSpPr>
+        <p:cNvPr id="1" name=""/>
+        <p:cNvGrpSpPr/>
+        <p:nvPr/>
+      </p:nvGrpSpPr>
+      <p:grpSpPr>
+        <a:xfrm>
+          <a:off x="0" y="0"/>
+          <a:ext cx="0" cy="0"/>
+          <a:chOff x="0" y="0"/>
+          <a:chExt cx="0" cy="0"/>
+        </a:xfrm>
+      </p:grpSpPr>
+      <p:sp>
+        <p:nvSpPr>
+          <p:cNvPr id="2" name="Title 1">
+            <a:extLst>
+              <a:ext uri="{FF2B5EF4-FFF2-40B4-BE49-F238E27FC236}">
+                <a16:creationId xmlns:a16="http://schemas.microsoft.com/office/drawing/2014/main" id="{FF6D6E6F-7CEA-435C-BFA9-42E109AE81F4}"/>
+              </a:ext>
+            </a:extLst>
+          </p:cNvPr>
+          <p:cNvSpPr>
+            <a:spLocks noGrp="1"/>
+          </p:cNvSpPr>
+          <p:nvPr>
+            <p:ph type="title"/>
+          </p:nvPr>
+        </p:nvSpPr>
+        <p:spPr/>
+        <p:txBody>
+          <a:bodyPr/>
+          <a:lstStyle/>
+          <a:p>
+            <a:r>
+              <a:rPr lang="en-US" dirty="0" err="1"/>
+              <a:t>Observatii</a:t>
+            </a:r>
+            <a:r>
+              <a:rPr lang="en-US" dirty="0"/>
+              <a:t> </a:t>
+            </a:r>
+            <a:r>
+              <a:rPr lang="en-US" dirty="0" err="1"/>
+              <a:t>si</a:t>
+            </a:r>
+            <a:r>
+              <a:rPr lang="en-US" dirty="0"/>
+              <a:t> </a:t>
+            </a:r>
+            <a:r>
+              <a:rPr lang="en-US" dirty="0" err="1"/>
+              <a:t>concluzii</a:t>
+            </a:r>
+            <a:endParaRPr lang="en-GB" dirty="0"/>
+          </a:p>
+        </p:txBody>
+      </p:sp>
+      <p:sp>
+        <p:nvSpPr>
+          <p:cNvPr id="3" name="Content Placeholder 2">
+            <a:extLst>
+              <a:ext uri="{FF2B5EF4-FFF2-40B4-BE49-F238E27FC236}">
+                <a16:creationId xmlns:a16="http://schemas.microsoft.com/office/drawing/2014/main" id="{EB9C9EC9-746E-4ED1-95AC-8A6FCDC724B5}"/>
+              </a:ext>
+            </a:extLst>
+          </p:cNvPr>
+          <p:cNvSpPr>
+            <a:spLocks noGrp="1"/>
+          </p:cNvSpPr>
+          <p:nvPr>
+            <p:ph idx="1"/>
+          </p:nvPr>
+        </p:nvSpPr>
+        <p:spPr/>
+        <p:txBody>
+          <a:bodyPr/>
+          <a:lstStyle/>
+          <a:p>
+            <a:r>
+              <a:rPr lang="en-GB"/>
+              <a:t>Constau</a:t>
+            </a:r>
+            <a:r>
+              <a:rPr lang="en-GB" dirty="0"/>
+              <a:t> </a:t>
+            </a:r>
+            <a:r>
+              <a:rPr lang="en-GB" dirty="0" err="1"/>
+              <a:t>în</a:t>
+            </a:r>
+            <a:r>
+              <a:rPr lang="en-GB" dirty="0"/>
+              <a:t> </a:t>
+            </a:r>
+            <a:r>
+              <a:rPr lang="en-GB" dirty="0" err="1"/>
+              <a:t>faptul</a:t>
+            </a:r>
+            <a:r>
+              <a:rPr lang="en-GB" dirty="0"/>
+              <a:t> </a:t>
+            </a:r>
+            <a:r>
+              <a:rPr lang="en-GB" dirty="0" err="1"/>
+              <a:t>că</a:t>
+            </a:r>
+            <a:r>
+              <a:rPr lang="en-GB" dirty="0"/>
+              <a:t> </a:t>
+            </a:r>
+            <a:r>
+              <a:rPr lang="en-GB" dirty="0" err="1"/>
+              <a:t>PHPUnit</a:t>
+            </a:r>
+            <a:r>
+              <a:rPr lang="en-GB" dirty="0"/>
+              <a:t> a </a:t>
+            </a:r>
+            <a:r>
+              <a:rPr lang="en-GB" dirty="0" err="1"/>
+              <a:t>făcut</a:t>
+            </a:r>
+            <a:r>
+              <a:rPr lang="en-GB" dirty="0"/>
+              <a:t> </a:t>
+            </a:r>
+            <a:r>
+              <a:rPr lang="en-GB" dirty="0" err="1"/>
+              <a:t>mult</a:t>
+            </a:r>
+            <a:r>
+              <a:rPr lang="en-GB" dirty="0"/>
+              <a:t> </a:t>
+            </a:r>
+            <a:r>
+              <a:rPr lang="en-GB" dirty="0" err="1"/>
+              <a:t>mai</a:t>
+            </a:r>
+            <a:r>
+              <a:rPr lang="en-GB" dirty="0"/>
+              <a:t> </a:t>
+            </a:r>
+            <a:r>
+              <a:rPr lang="en-GB" dirty="0" err="1"/>
+              <a:t>facilă</a:t>
+            </a:r>
+            <a:r>
+              <a:rPr lang="en-GB" dirty="0"/>
+              <a:t> </a:t>
+            </a:r>
+            <a:r>
+              <a:rPr lang="en-GB" dirty="0" err="1"/>
+              <a:t>testarea</a:t>
+            </a:r>
+            <a:r>
+              <a:rPr lang="en-GB" dirty="0"/>
+              <a:t> </a:t>
+            </a:r>
+            <a:r>
+              <a:rPr lang="en-GB" dirty="0" err="1"/>
+              <a:t>decît</a:t>
+            </a:r>
+            <a:r>
+              <a:rPr lang="en-GB" dirty="0"/>
+              <a:t> </a:t>
+            </a:r>
+            <a:r>
+              <a:rPr lang="en-GB" dirty="0" err="1"/>
+              <a:t>dacă</a:t>
+            </a:r>
+            <a:r>
+              <a:rPr lang="en-GB" dirty="0"/>
+              <a:t> </a:t>
+            </a:r>
+            <a:r>
+              <a:rPr lang="en-GB" dirty="0" err="1"/>
+              <a:t>rulam</a:t>
+            </a:r>
+            <a:r>
+              <a:rPr lang="en-GB" dirty="0"/>
+              <a:t> direct </a:t>
+            </a:r>
+            <a:r>
+              <a:rPr lang="en-GB" dirty="0" err="1"/>
+              <a:t>codul</a:t>
+            </a:r>
+            <a:r>
+              <a:rPr lang="en-GB" dirty="0"/>
+              <a:t> </a:t>
+            </a:r>
+            <a:r>
+              <a:rPr lang="en-GB" dirty="0" err="1"/>
+              <a:t>și</a:t>
+            </a:r>
+            <a:r>
+              <a:rPr lang="en-GB" dirty="0"/>
+              <a:t> </a:t>
+            </a:r>
+            <a:r>
+              <a:rPr lang="en-GB" dirty="0" err="1"/>
+              <a:t>așteptam</a:t>
+            </a:r>
+            <a:r>
+              <a:rPr lang="en-GB" dirty="0"/>
+              <a:t> </a:t>
+            </a:r>
+            <a:r>
+              <a:rPr lang="en-GB" dirty="0" err="1"/>
+              <a:t>să</a:t>
+            </a:r>
+            <a:r>
+              <a:rPr lang="en-GB" dirty="0"/>
+              <a:t> </a:t>
+            </a:r>
+            <a:r>
+              <a:rPr lang="en-GB" dirty="0" err="1"/>
+              <a:t>apară</a:t>
+            </a:r>
+            <a:r>
+              <a:rPr lang="en-GB" dirty="0"/>
+              <a:t> </a:t>
+            </a:r>
+            <a:r>
+              <a:rPr lang="en-GB" dirty="0" err="1"/>
+              <a:t>erori</a:t>
+            </a:r>
+            <a:r>
+              <a:rPr lang="en-GB" dirty="0"/>
+              <a:t>, </a:t>
+            </a:r>
+            <a:r>
+              <a:rPr lang="en-GB" dirty="0" err="1"/>
+              <a:t>și</a:t>
+            </a:r>
+            <a:r>
+              <a:rPr lang="en-GB" dirty="0"/>
+              <a:t> </a:t>
+            </a:r>
+            <a:r>
+              <a:rPr lang="en-GB" dirty="0" err="1"/>
+              <a:t>să</a:t>
+            </a:r>
+            <a:r>
+              <a:rPr lang="en-GB" dirty="0"/>
+              <a:t> </a:t>
+            </a:r>
+            <a:r>
+              <a:rPr lang="en-GB" dirty="0" err="1"/>
+              <a:t>căutăm</a:t>
+            </a:r>
+            <a:r>
+              <a:rPr lang="en-GB" dirty="0"/>
+              <a:t> pe moment </a:t>
+            </a:r>
+            <a:r>
+              <a:rPr lang="en-GB" dirty="0" err="1"/>
+              <a:t>cazuri</a:t>
+            </a:r>
+            <a:r>
+              <a:rPr lang="en-GB" dirty="0"/>
+              <a:t>. De </a:t>
+            </a:r>
+            <a:r>
+              <a:rPr lang="en-GB" dirty="0" err="1"/>
+              <a:t>exemplu</a:t>
+            </a:r>
+            <a:r>
+              <a:rPr lang="en-GB" dirty="0"/>
+              <a:t>, </a:t>
+            </a:r>
+            <a:r>
+              <a:rPr lang="en-GB" dirty="0" err="1"/>
+              <a:t>phpunit</a:t>
+            </a:r>
+            <a:r>
+              <a:rPr lang="en-GB" dirty="0"/>
+              <a:t> </a:t>
+            </a:r>
+            <a:r>
+              <a:rPr lang="en-GB" dirty="0" err="1"/>
+              <a:t>imi</a:t>
+            </a:r>
+            <a:r>
+              <a:rPr lang="en-GB" dirty="0"/>
+              <a:t> </a:t>
+            </a:r>
+            <a:r>
+              <a:rPr lang="en-GB" dirty="0" err="1"/>
+              <a:t>arata</a:t>
+            </a:r>
+            <a:r>
+              <a:rPr lang="en-GB" dirty="0"/>
+              <a:t> in terminal </a:t>
+            </a:r>
+            <a:r>
+              <a:rPr lang="en-GB" dirty="0" err="1"/>
+              <a:t>erori</a:t>
+            </a:r>
+            <a:r>
+              <a:rPr lang="en-GB" dirty="0"/>
+              <a:t> </a:t>
+            </a:r>
+            <a:r>
+              <a:rPr lang="en-GB" dirty="0" err="1"/>
+              <a:t>daca</a:t>
+            </a:r>
+            <a:r>
+              <a:rPr lang="en-GB" dirty="0"/>
+              <a:t> </a:t>
+            </a:r>
+            <a:r>
+              <a:rPr lang="en-GB" dirty="0" err="1"/>
+              <a:t>incercam</a:t>
+            </a:r>
+            <a:r>
+              <a:rPr lang="en-GB" dirty="0"/>
+              <a:t> </a:t>
+            </a:r>
+            <a:r>
+              <a:rPr lang="en-GB" dirty="0" err="1"/>
+              <a:t>sa</a:t>
+            </a:r>
+            <a:r>
+              <a:rPr lang="en-GB" dirty="0"/>
+              <a:t> </a:t>
+            </a:r>
+            <a:r>
+              <a:rPr lang="en-GB" dirty="0" err="1"/>
+              <a:t>fac</a:t>
+            </a:r>
+            <a:r>
+              <a:rPr lang="en-GB" dirty="0"/>
+              <a:t> o </a:t>
+            </a:r>
+            <a:r>
+              <a:rPr lang="en-GB" dirty="0" err="1"/>
+              <a:t>asertie</a:t>
+            </a:r>
+            <a:r>
+              <a:rPr lang="en-GB" dirty="0"/>
+              <a:t> </a:t>
+            </a:r>
+            <a:r>
+              <a:rPr lang="en-GB" dirty="0" err="1"/>
+              <a:t>necorespunzatoare</a:t>
+            </a:r>
+            <a:r>
+              <a:rPr lang="en-GB" dirty="0"/>
+              <a:t> </a:t>
+            </a:r>
+            <a:r>
+              <a:rPr lang="en-GB" dirty="0" err="1"/>
+              <a:t>responseului</a:t>
+            </a:r>
+            <a:r>
+              <a:rPr lang="en-GB" dirty="0"/>
+              <a:t> (la </a:t>
+            </a:r>
+            <a:r>
+              <a:rPr lang="en-GB" dirty="0" err="1"/>
+              <a:t>fetchul</a:t>
+            </a:r>
+            <a:r>
+              <a:rPr lang="en-GB" dirty="0"/>
+              <a:t> </a:t>
+            </a:r>
+            <a:r>
+              <a:rPr lang="en-GB" dirty="0" err="1"/>
+              <a:t>pentru</a:t>
+            </a:r>
+            <a:r>
+              <a:rPr lang="en-GB" dirty="0"/>
+              <a:t> </a:t>
+            </a:r>
+            <a:r>
+              <a:rPr lang="en-GB" dirty="0" err="1"/>
+              <a:t>toate</a:t>
+            </a:r>
+            <a:r>
+              <a:rPr lang="en-GB" dirty="0"/>
+              <a:t> </a:t>
+            </a:r>
+            <a:r>
+              <a:rPr lang="en-GB" dirty="0" err="1"/>
+              <a:t>notitele</a:t>
+            </a:r>
+            <a:r>
+              <a:rPr lang="en-GB" dirty="0"/>
+              <a:t>, initial </a:t>
+            </a:r>
+            <a:r>
+              <a:rPr lang="en-GB" dirty="0" err="1"/>
+              <a:t>voiam</a:t>
+            </a:r>
+            <a:r>
+              <a:rPr lang="en-GB" dirty="0"/>
+              <a:t> </a:t>
+            </a:r>
+            <a:r>
+              <a:rPr lang="en-GB" dirty="0" err="1"/>
+              <a:t>sa</a:t>
+            </a:r>
+            <a:r>
+              <a:rPr lang="en-GB" dirty="0"/>
+              <a:t> </a:t>
+            </a:r>
+            <a:r>
+              <a:rPr lang="en-GB" dirty="0" err="1"/>
+              <a:t>folosesc</a:t>
+            </a:r>
+            <a:r>
+              <a:rPr lang="en-GB" dirty="0"/>
+              <a:t> tot </a:t>
+            </a:r>
+            <a:r>
+              <a:rPr lang="en-GB" dirty="0" err="1"/>
+              <a:t>assertTrue</a:t>
+            </a:r>
+            <a:r>
+              <a:rPr lang="en-GB" dirty="0"/>
+              <a:t>, </a:t>
+            </a:r>
+            <a:r>
+              <a:rPr lang="en-GB" dirty="0" err="1"/>
+              <a:t>dar</a:t>
+            </a:r>
+            <a:r>
+              <a:rPr lang="en-GB" dirty="0"/>
+              <a:t> </a:t>
+            </a:r>
+            <a:r>
+              <a:rPr lang="en-GB" dirty="0" err="1"/>
+              <a:t>pentru</a:t>
+            </a:r>
+            <a:r>
+              <a:rPr lang="en-GB" dirty="0"/>
+              <a:t> </a:t>
+            </a:r>
+            <a:r>
+              <a:rPr lang="en-GB" dirty="0" err="1"/>
+              <a:t>fecthuri</a:t>
+            </a:r>
+            <a:r>
+              <a:rPr lang="en-GB" dirty="0"/>
+              <a:t> de </a:t>
+            </a:r>
+            <a:r>
+              <a:rPr lang="en-GB" dirty="0" err="1"/>
+              <a:t>mai</a:t>
+            </a:r>
+            <a:r>
+              <a:rPr lang="en-GB" dirty="0"/>
+              <a:t> </a:t>
+            </a:r>
+            <a:r>
+              <a:rPr lang="en-GB" dirty="0" err="1"/>
+              <a:t>multe</a:t>
+            </a:r>
+            <a:r>
+              <a:rPr lang="en-GB" dirty="0"/>
+              <a:t> </a:t>
+            </a:r>
+            <a:r>
+              <a:rPr lang="en-GB" dirty="0" err="1"/>
+              <a:t>randuri</a:t>
+            </a:r>
+            <a:r>
+              <a:rPr lang="en-GB" dirty="0"/>
+              <a:t> </a:t>
+            </a:r>
+            <a:r>
+              <a:rPr lang="en-GB" dirty="0" err="1"/>
+              <a:t>functia</a:t>
+            </a:r>
+            <a:r>
+              <a:rPr lang="en-GB" dirty="0"/>
+              <a:t> </a:t>
+            </a:r>
+            <a:r>
+              <a:rPr lang="en-GB" dirty="0" err="1"/>
+              <a:t>mysqli_query</a:t>
+            </a:r>
+            <a:r>
+              <a:rPr lang="en-GB" dirty="0"/>
+              <a:t> nu </a:t>
+            </a:r>
+            <a:r>
+              <a:rPr lang="en-GB" dirty="0" err="1"/>
+              <a:t>returneaza</a:t>
+            </a:r>
+            <a:r>
+              <a:rPr lang="en-GB" dirty="0"/>
+              <a:t> un </a:t>
+            </a:r>
+            <a:r>
+              <a:rPr lang="en-GB" dirty="0" err="1"/>
+              <a:t>boolean</a:t>
+            </a:r>
+            <a:r>
+              <a:rPr lang="en-GB" dirty="0"/>
+              <a:t> ci un </a:t>
+            </a:r>
+            <a:r>
+              <a:rPr lang="en-GB" dirty="0" err="1"/>
+              <a:t>obiect</a:t>
+            </a:r>
+            <a:r>
+              <a:rPr lang="en-GB" dirty="0"/>
+              <a:t> in </a:t>
+            </a:r>
+            <a:r>
+              <a:rPr lang="en-GB" dirty="0" err="1"/>
+              <a:t>cazul</a:t>
+            </a:r>
+            <a:r>
+              <a:rPr lang="en-GB" dirty="0"/>
+              <a:t> in care s-au </a:t>
+            </a:r>
+            <a:r>
+              <a:rPr lang="en-GB" dirty="0" err="1"/>
+              <a:t>fetchuit</a:t>
+            </a:r>
+            <a:r>
+              <a:rPr lang="en-GB" dirty="0"/>
+              <a:t> </a:t>
+            </a:r>
+            <a:r>
+              <a:rPr lang="en-GB" dirty="0" err="1"/>
+              <a:t>mai</a:t>
+            </a:r>
+            <a:r>
+              <a:rPr lang="en-GB" dirty="0"/>
+              <a:t> </a:t>
+            </a:r>
+            <a:r>
+              <a:rPr lang="en-GB" dirty="0" err="1"/>
+              <a:t>multe</a:t>
+            </a:r>
+            <a:r>
+              <a:rPr lang="en-GB" dirty="0"/>
+              <a:t> </a:t>
+            </a:r>
+            <a:r>
+              <a:rPr lang="en-GB" dirty="0" err="1"/>
+              <a:t>randuri</a:t>
+            </a:r>
+            <a:r>
+              <a:rPr lang="en-GB" dirty="0"/>
+              <a:t>)</a:t>
+            </a:r>
+          </a:p>
+          <a:p>
+            <a:endParaRPr lang="en-GB" dirty="0"/>
+          </a:p>
+        </p:txBody>
+      </p:sp>
+    </p:spTree>
+    <p:extLst>
+      <p:ext uri="{BB962C8B-B14F-4D97-AF65-F5344CB8AC3E}">
+        <p14:creationId xmlns:p14="http://schemas.microsoft.com/office/powerpoint/2010/main" val="1141964213"/>
+      </p:ext>
+    </p:extLst>
+  </p:cSld>
+  <p:clrMapOvr>
+    <a:masterClrMapping/>
+  </p:clrMapOvr>
+</p:sld>
+</file>
+
 <file path=ppt/slides/slide2.xml><?xml version="1.0" encoding="utf-8"?>
 <p:sld xmlns:a="http://schemas.openxmlformats.org/drawingml/2006/main" xmlns:r="http://schemas.openxmlformats.org/officeDocument/2006/relationships" xmlns:p="http://schemas.openxmlformats.org/presentationml/2006/main">
   <p:cSld>

</xml_diff>